<commit_message>
updated diff scatter plot in presentation
</commit_message>
<xml_diff>
--- a/documents/221103_bachelor_outline.pptx
+++ b/documents/221103_bachelor_outline.pptx
@@ -19,8 +19,8 @@
     <p:sldId id="391" r:id="rId7"/>
     <p:sldId id="392" r:id="rId8"/>
     <p:sldId id="393" r:id="rId9"/>
-    <p:sldId id="395" r:id="rId10"/>
-    <p:sldId id="394" r:id="rId11"/>
+    <p:sldId id="394" r:id="rId10"/>
+    <p:sldId id="395" r:id="rId11"/>
     <p:sldId id="396" r:id="rId12"/>
   </p:sldIdLst>
   <p:sldSz cx="12192000" cy="6858000"/>
@@ -1041,30 +1041,83 @@
           <a:lstStyle/>
           <a:p>
             <a:r>
-              <a:rPr lang="en-US" noProof="0" dirty="0"/>
-              <a:t>Each single omics data is from a different cohort</a:t>
-            </a:r>
-          </a:p>
-          <a:p>
-            <a:endParaRPr lang="en-US" noProof="0" dirty="0"/>
-          </a:p>
-          <a:p>
-            <a:r>
-              <a:rPr lang="en-US" noProof="0" dirty="0"/>
-              <a:t>every cohort was male except </a:t>
-            </a:r>
-            <a:r>
-              <a:rPr lang="en-US" noProof="0" dirty="0" err="1"/>
-              <a:t>RNASeq</a:t>
-            </a:r>
-            <a:endParaRPr lang="en-US" noProof="0" dirty="0"/>
+              <a:rPr lang="de-DE" sz="1200" err="1"/>
+              <a:t>Some</a:t>
+            </a:r>
+            <a:r>
+              <a:rPr lang="de-DE" sz="1200"/>
+              <a:t> </a:t>
+            </a:r>
+            <a:r>
+              <a:rPr lang="de-DE" sz="1200" err="1"/>
+              <a:t>analysis</a:t>
+            </a:r>
+            <a:r>
+              <a:rPr lang="de-DE" sz="1200"/>
+              <a:t> </a:t>
+            </a:r>
+            <a:r>
+              <a:rPr lang="de-DE" sz="1200" err="1"/>
+              <a:t>already</a:t>
+            </a:r>
+            <a:r>
+              <a:rPr lang="de-DE" sz="1200"/>
+              <a:t> </a:t>
+            </a:r>
+            <a:r>
+              <a:rPr lang="de-DE" sz="1200" err="1"/>
+              <a:t>done</a:t>
+            </a:r>
+            <a:endParaRPr lang="de-DE" sz="1200"/>
+          </a:p>
+          <a:p>
+            <a:endParaRPr lang="de-DE" sz="1200"/>
+          </a:p>
+          <a:p>
+            <a:r>
+              <a:rPr lang="de-DE" sz="1200" err="1"/>
+              <a:t>Incorporate</a:t>
+            </a:r>
+            <a:r>
+              <a:rPr lang="de-DE" sz="1200"/>
+              <a:t> </a:t>
+            </a:r>
+            <a:r>
+              <a:rPr lang="de-DE" sz="1200" err="1"/>
+              <a:t>other</a:t>
+            </a:r>
+            <a:r>
+              <a:rPr lang="de-DE" sz="1200"/>
+              <a:t> </a:t>
+            </a:r>
+            <a:r>
+              <a:rPr lang="de-DE" sz="1200" err="1"/>
+              <a:t>datatypes</a:t>
+            </a:r>
+            <a:r>
+              <a:rPr lang="de-DE" sz="1200"/>
+              <a:t> in </a:t>
+            </a:r>
+            <a:r>
+              <a:rPr lang="de-DE" sz="1200" err="1"/>
+              <a:t>the</a:t>
+            </a:r>
+            <a:r>
+              <a:rPr lang="de-DE" sz="1200"/>
+              <a:t> </a:t>
+            </a:r>
+            <a:r>
+              <a:rPr lang="de-DE" sz="1200" err="1"/>
+              <a:t>future</a:t>
+            </a:r>
+            <a:endParaRPr lang="de-DE" sz="1200"/>
           </a:p>
         </p:txBody>
       </p:sp>
     </p:spTree>
     <p:extLst>
       <p:ext uri="{BB962C8B-B14F-4D97-AF65-F5344CB8AC3E}">
-        <p14:creationId xmlns:p14="http://schemas.microsoft.com/office/powerpoint/2010/main" val="3062381526"/>
+        <p14:creationId xmlns:p14="http://schemas.microsoft.com/office/powerpoint/2010/main" val="380331589"/>
       </p:ext>
     </p:extLst>
   </p:cSld>
@@ -1119,83 +1172,30 @@
           <a:lstStyle/>
           <a:p>
             <a:r>
-              <a:rPr lang="de-DE" sz="1200" err="1"/>
-              <a:t>Some</a:t>
-            </a:r>
-            <a:r>
-              <a:rPr lang="de-DE" sz="1200"/>
-              <a:t> </a:t>
-            </a:r>
-            <a:r>
-              <a:rPr lang="de-DE" sz="1200" err="1"/>
-              <a:t>analysis</a:t>
-            </a:r>
-            <a:r>
-              <a:rPr lang="de-DE" sz="1200"/>
-              <a:t> </a:t>
-            </a:r>
-            <a:r>
-              <a:rPr lang="de-DE" sz="1200" err="1"/>
-              <a:t>already</a:t>
-            </a:r>
-            <a:r>
-              <a:rPr lang="de-DE" sz="1200"/>
-              <a:t> </a:t>
-            </a:r>
-            <a:r>
-              <a:rPr lang="de-DE" sz="1200" err="1"/>
-              <a:t>done</a:t>
-            </a:r>
-            <a:endParaRPr lang="de-DE" sz="1200"/>
-          </a:p>
-          <a:p>
-            <a:endParaRPr lang="de-DE" sz="1200"/>
-          </a:p>
-          <a:p>
-            <a:r>
-              <a:rPr lang="de-DE" sz="1200" err="1"/>
-              <a:t>Incorporate</a:t>
-            </a:r>
-            <a:r>
-              <a:rPr lang="de-DE" sz="1200"/>
-              <a:t> </a:t>
-            </a:r>
-            <a:r>
-              <a:rPr lang="de-DE" sz="1200" err="1"/>
-              <a:t>other</a:t>
-            </a:r>
-            <a:r>
-              <a:rPr lang="de-DE" sz="1200"/>
-              <a:t> </a:t>
-            </a:r>
-            <a:r>
-              <a:rPr lang="de-DE" sz="1200" err="1"/>
-              <a:t>datatypes</a:t>
-            </a:r>
-            <a:r>
-              <a:rPr lang="de-DE" sz="1200"/>
-              <a:t> in </a:t>
-            </a:r>
-            <a:r>
-              <a:rPr lang="de-DE" sz="1200" err="1"/>
-              <a:t>the</a:t>
-            </a:r>
-            <a:r>
-              <a:rPr lang="de-DE" sz="1200"/>
-              <a:t> </a:t>
-            </a:r>
-            <a:r>
-              <a:rPr lang="de-DE" sz="1200" err="1"/>
-              <a:t>future</a:t>
-            </a:r>
-            <a:endParaRPr lang="de-DE" sz="1200"/>
+              <a:rPr lang="en-US" noProof="0" dirty="0"/>
+              <a:t>Each single omics data is from a different cohort</a:t>
+            </a:r>
+          </a:p>
+          <a:p>
+            <a:endParaRPr lang="en-US" noProof="0" dirty="0"/>
+          </a:p>
+          <a:p>
+            <a:r>
+              <a:rPr lang="en-US" noProof="0" dirty="0"/>
+              <a:t>every cohort was male except </a:t>
+            </a:r>
+            <a:r>
+              <a:rPr lang="en-US" noProof="0" dirty="0" err="1"/>
+              <a:t>RNASeq</a:t>
+            </a:r>
+            <a:endParaRPr lang="en-US" noProof="0" dirty="0"/>
           </a:p>
         </p:txBody>
       </p:sp>
     </p:spTree>
     <p:extLst>
       <p:ext uri="{BB962C8B-B14F-4D97-AF65-F5344CB8AC3E}">
-        <p14:creationId xmlns:p14="http://schemas.microsoft.com/office/powerpoint/2010/main" val="380331589"/>
+        <p14:creationId xmlns:p14="http://schemas.microsoft.com/office/powerpoint/2010/main" val="3062381526"/>
       </p:ext>
     </p:extLst>
   </p:cSld>
@@ -17920,23 +17920,16 @@
           <a:lstStyle/>
           <a:p>
             <a:r>
-              <a:rPr lang="en-US" dirty="0" err="1"/>
-              <a:t>Proteofit</a:t>
-            </a:r>
-            <a:r>
-              <a:rPr lang="en-US"/>
-              <a:t> – </a:t>
-            </a:r>
-            <a:r>
-              <a:rPr lang="en-US" err="1"/>
-              <a:t>RNAseq</a:t>
-            </a:r>
-            <a:br>
-              <a:rPr lang="en-US"/>
-            </a:br>
-            <a:r>
-              <a:rPr lang="en-US"/>
-              <a:t>Bachelor thesis project outline</a:t>
+              <a:rPr lang="en-US" sz="4000" dirty="0"/>
+              <a:t>Investigation of Nfe2l1 in muscle metabolism using mouse </a:t>
+            </a:r>
+            <a:r>
+              <a:rPr lang="en-US" sz="4000" dirty="0" err="1"/>
+              <a:t>multiomics</a:t>
+            </a:r>
+            <a:r>
+              <a:rPr lang="en-US" sz="4000" dirty="0"/>
+              <a:t> data in gastrocnemius and soleus</a:t>
             </a:r>
           </a:p>
         </p:txBody>
@@ -18084,13 +18077,8 @@
           <a:p>
             <a:r>
               <a:rPr lang="en-US" dirty="0"/>
-              <a:t>About </a:t>
-            </a:r>
-            <a:r>
-              <a:rPr lang="en-US" dirty="0" err="1"/>
-              <a:t>Proteofit</a:t>
-            </a:r>
-            <a:endParaRPr lang="en-US" dirty="0"/>
+              <a:t>Aim of the project</a:t>
+            </a:r>
           </a:p>
           <a:p>
             <a:r>
@@ -18101,13 +18089,13 @@
           <a:p>
             <a:r>
               <a:rPr lang="en-US" dirty="0"/>
+              <a:t>Workflow of the project</a:t>
+            </a:r>
+          </a:p>
+          <a:p>
+            <a:r>
+              <a:rPr lang="en-US" dirty="0"/>
               <a:t>Preliminary analysis</a:t>
-            </a:r>
-          </a:p>
-          <a:p>
-            <a:r>
-              <a:rPr lang="en-US" dirty="0"/>
-              <a:t>Outline</a:t>
             </a:r>
           </a:p>
         </p:txBody>
@@ -18156,7 +18144,7 @@
         </p:nvGrpSpPr>
         <p:grpSpPr>
           <a:xfrm>
-            <a:off x="536958" y="3938110"/>
+            <a:off x="455538" y="1450113"/>
             <a:ext cx="5728213" cy="1565881"/>
             <a:chOff x="604157" y="3158422"/>
             <a:chExt cx="5905500" cy="1638300"/>
@@ -18260,115 +18248,9 @@
           <a:p>
             <a:r>
               <a:rPr lang="en-US" dirty="0"/>
-              <a:t>About</a:t>
+              <a:t>Aim of the project </a:t>
             </a:r>
             <a:endParaRPr lang="en-US" i="1" dirty="0"/>
-          </a:p>
-        </p:txBody>
-      </p:sp>
-      <p:sp>
-        <p:nvSpPr>
-          <p:cNvPr id="21" name="Textplatzhalter 20">
-            <a:extLst>
-              <a:ext uri="{FF2B5EF4-FFF2-40B4-BE49-F238E27FC236}">
-                <a16:creationId xmlns:a16="http://schemas.microsoft.com/office/drawing/2014/main" id="{9635A95F-77C9-2242-A3FA-55C916238FD1}"/>
-              </a:ext>
-            </a:extLst>
-          </p:cNvPr>
-          <p:cNvSpPr>
-            <a:spLocks noGrp="1"/>
-          </p:cNvSpPr>
-          <p:nvPr>
-            <p:ph type="body" sz="quarter" idx="35"/>
-          </p:nvPr>
-        </p:nvSpPr>
-        <p:spPr>
-          <a:xfrm>
-            <a:off x="713497" y="1282456"/>
-            <a:ext cx="5551674" cy="2123658"/>
-          </a:xfrm>
-        </p:spPr>
-        <p:txBody>
-          <a:bodyPr/>
-          <a:lstStyle/>
-          <a:p>
-            <a:pPr marL="0" indent="0">
-              <a:buNone/>
-            </a:pPr>
-            <a:r>
-              <a:rPr lang="en-US" sz="2000" b="1" i="1" dirty="0" err="1"/>
-              <a:t>Proteofit</a:t>
-            </a:r>
-            <a:r>
-              <a:rPr lang="en-US" sz="2000" b="1" i="1" dirty="0"/>
-              <a:t>:</a:t>
-            </a:r>
-            <a:endParaRPr lang="en-US" sz="2000" b="1" dirty="0"/>
-          </a:p>
-          <a:p>
-            <a:pPr marL="0" indent="0">
-              <a:buNone/>
-            </a:pPr>
-            <a:r>
-              <a:rPr lang="en-US" dirty="0"/>
-              <a:t>“ECR project to </a:t>
-            </a:r>
-            <a:r>
-              <a:rPr lang="en-GB" dirty="0"/>
-              <a:t>investigate the role of </a:t>
-            </a:r>
-            <a:r>
-              <a:rPr lang="en-GB" b="1" dirty="0"/>
-              <a:t>Nfe2l1</a:t>
-            </a:r>
-            <a:r>
-              <a:rPr lang="en-GB" dirty="0"/>
-              <a:t> in muscle specific adaptation to exercise and obesity.”</a:t>
-            </a:r>
-          </a:p>
-          <a:p>
-            <a:pPr marL="0" indent="0">
-              <a:buNone/>
-            </a:pPr>
-            <a:endParaRPr lang="en-GB" dirty="0"/>
-          </a:p>
-          <a:p>
-            <a:pPr marL="0" indent="0">
-              <a:buNone/>
-            </a:pPr>
-            <a:r>
-              <a:rPr lang="en-DE" dirty="0"/>
-              <a:t>⇒</a:t>
-            </a:r>
-            <a:r>
-              <a:rPr lang="en-GB" dirty="0"/>
-              <a:t> understand molecular processes of the muscle cell</a:t>
-            </a:r>
-          </a:p>
-          <a:p>
-            <a:pPr marL="0" indent="0">
-              <a:buNone/>
-            </a:pPr>
-            <a:endParaRPr lang="en-GB" dirty="0"/>
-          </a:p>
-          <a:p>
-            <a:pPr marL="0" indent="0">
-              <a:buNone/>
-            </a:pPr>
-            <a:r>
-              <a:rPr lang="en-DE" dirty="0"/>
-              <a:t>⇒</a:t>
-            </a:r>
-            <a:r>
-              <a:rPr lang="en-GB" dirty="0"/>
-              <a:t> find novel mechanisms of protein homeostasis</a:t>
-            </a:r>
-          </a:p>
-          <a:p>
-            <a:pPr marL="0" indent="0">
-              <a:buNone/>
-            </a:pPr>
-            <a:endParaRPr lang="en-GB" dirty="0"/>
           </a:p>
         </p:txBody>
       </p:sp>
@@ -18394,7 +18276,7 @@
         </p:blipFill>
         <p:spPr>
           <a:xfrm>
-            <a:off x="536959" y="3918269"/>
+            <a:off x="455539" y="1430272"/>
             <a:ext cx="5727744" cy="1585723"/>
           </a:xfrm>
           <a:prstGeom prst="rect">
@@ -18451,7 +18333,7 @@
         </p:nvSpPr>
         <p:spPr>
           <a:xfrm>
-            <a:off x="7615775" y="455662"/>
+            <a:off x="975023" y="4057732"/>
             <a:ext cx="3293954" cy="1384995"/>
           </a:xfrm>
           <a:prstGeom prst="rect">
@@ -18523,165 +18405,12 @@
           </a:p>
         </p:txBody>
       </p:sp>
-      <p:grpSp>
-        <p:nvGrpSpPr>
-          <p:cNvPr id="18" name="Group 17">
-            <a:extLst>
-              <a:ext uri="{FF2B5EF4-FFF2-40B4-BE49-F238E27FC236}">
-                <a16:creationId xmlns:a16="http://schemas.microsoft.com/office/drawing/2014/main" id="{0A415AE7-41BB-CA78-3ECF-E2CA31275442}"/>
-              </a:ext>
-            </a:extLst>
-          </p:cNvPr>
-          <p:cNvGrpSpPr/>
-          <p:nvPr/>
-        </p:nvGrpSpPr>
-        <p:grpSpPr>
-          <a:xfrm>
-            <a:off x="6770783" y="2223134"/>
-            <a:ext cx="4884258" cy="2107441"/>
-            <a:chOff x="8379050" y="3378836"/>
-            <a:chExt cx="4884258" cy="2107441"/>
-          </a:xfrm>
-        </p:grpSpPr>
-        <p:pic>
-          <p:nvPicPr>
-            <p:cNvPr id="2" name="Picture 1">
-              <a:extLst>
-                <a:ext uri="{FF2B5EF4-FFF2-40B4-BE49-F238E27FC236}">
-                  <a16:creationId xmlns:a16="http://schemas.microsoft.com/office/drawing/2014/main" id="{604AE077-6099-5C6F-E6C8-90F73DF0FB47}"/>
-                </a:ext>
-              </a:extLst>
-            </p:cNvPr>
-            <p:cNvPicPr>
-              <a:picLocks noChangeAspect="1"/>
-            </p:cNvPicPr>
-            <p:nvPr/>
-          </p:nvPicPr>
-          <p:blipFill rotWithShape="1">
-            <a:blip r:embed="rId5"/>
-            <a:srcRect t="13762"/>
-            <a:stretch/>
-          </p:blipFill>
-          <p:spPr>
-            <a:xfrm>
-              <a:off x="8379050" y="3933076"/>
-              <a:ext cx="2244964" cy="1551875"/>
-            </a:xfrm>
-            <a:prstGeom prst="rect">
-              <a:avLst/>
-            </a:prstGeom>
-          </p:spPr>
-        </p:pic>
-        <p:sp>
-          <p:nvSpPr>
-            <p:cNvPr id="4" name="TextBox 3">
-              <a:extLst>
-                <a:ext uri="{FF2B5EF4-FFF2-40B4-BE49-F238E27FC236}">
-                  <a16:creationId xmlns:a16="http://schemas.microsoft.com/office/drawing/2014/main" id="{20B63507-1103-7D66-D24C-074B77D452E1}"/>
-                </a:ext>
-              </a:extLst>
-            </p:cNvPr>
-            <p:cNvSpPr txBox="1"/>
-            <p:nvPr/>
-          </p:nvSpPr>
-          <p:spPr>
-            <a:xfrm>
-              <a:off x="10624014" y="4778391"/>
-              <a:ext cx="2639294" cy="707886"/>
-            </a:xfrm>
-            <a:prstGeom prst="rect">
-              <a:avLst/>
-            </a:prstGeom>
-            <a:noFill/>
-          </p:spPr>
-          <p:txBody>
-            <a:bodyPr wrap="square" rtlCol="0">
-              <a:spAutoFit/>
-            </a:bodyPr>
-            <a:lstStyle/>
-            <a:p>
-              <a:r>
-                <a:rPr lang="en-GB" sz="1000" dirty="0">
-                  <a:effectLst/>
-                  <a:latin typeface="ArialMT"/>
-                </a:rPr>
-                <a:t>Levels of mRNA from gastrocnemius muscle from wild-type (WT) and skeletal muscle (Acta1-Cre) Nfe2l1</a:t>
-              </a:r>
-              <a:br>
-                <a:rPr lang="en-GB" sz="1000" dirty="0">
-                  <a:effectLst/>
-                  <a:latin typeface="ArialMT"/>
-                </a:rPr>
-              </a:br>
-              <a:r>
-                <a:rPr lang="en-GB" sz="1000" dirty="0">
-                  <a:effectLst/>
-                  <a:latin typeface="ArialMT"/>
-                </a:rPr>
-                <a:t>knock-out (KO) mice.</a:t>
-              </a:r>
-              <a:endParaRPr lang="en-GB" sz="1000" dirty="0">
-                <a:effectLst/>
-              </a:endParaRPr>
-            </a:p>
-          </p:txBody>
-        </p:sp>
-        <p:sp>
-          <p:nvSpPr>
-            <p:cNvPr id="14" name="TextBox 13">
-              <a:extLst>
-                <a:ext uri="{FF2B5EF4-FFF2-40B4-BE49-F238E27FC236}">
-                  <a16:creationId xmlns:a16="http://schemas.microsoft.com/office/drawing/2014/main" id="{0F9C86E6-088E-8A18-FC68-A201C072AC2A}"/>
-                </a:ext>
-              </a:extLst>
-            </p:cNvPr>
-            <p:cNvSpPr txBox="1"/>
-            <p:nvPr/>
-          </p:nvSpPr>
-          <p:spPr>
-            <a:xfrm>
-              <a:off x="8555233" y="3378836"/>
-              <a:ext cx="2258952" cy="523220"/>
-            </a:xfrm>
-            <a:prstGeom prst="rect">
-              <a:avLst/>
-            </a:prstGeom>
-            <a:noFill/>
-          </p:spPr>
-          <p:txBody>
-            <a:bodyPr wrap="none" rtlCol="0">
-              <a:spAutoFit/>
-            </a:bodyPr>
-            <a:lstStyle/>
-            <a:p>
-              <a:r>
-                <a:rPr lang="en-US" sz="1400" b="1" dirty="0"/>
-                <a:t>tissue specific knockout</a:t>
-              </a:r>
-            </a:p>
-            <a:p>
-              <a:r>
-                <a:rPr lang="en-US" sz="1400" dirty="0"/>
-                <a:t>(</a:t>
-              </a:r>
-              <a:r>
-                <a:rPr lang="en-US" sz="1400" i="1" dirty="0"/>
-                <a:t>Cre-Lox recombination</a:t>
-              </a:r>
-              <a:r>
-                <a:rPr lang="en-US" sz="1400" dirty="0"/>
-                <a:t>)</a:t>
-              </a:r>
-            </a:p>
-          </p:txBody>
-        </p:sp>
-      </p:grpSp>
       <p:sp>
         <p:nvSpPr>
-          <p:cNvPr id="15" name="TextBox 14">
-            <a:extLst>
-              <a:ext uri="{FF2B5EF4-FFF2-40B4-BE49-F238E27FC236}">
-                <a16:creationId xmlns:a16="http://schemas.microsoft.com/office/drawing/2014/main" id="{1AB435AB-6F27-9FE5-ED69-453C1ABA998E}"/>
+          <p:cNvPr id="20" name="TextBox 19">
+            <a:extLst>
+              <a:ext uri="{FF2B5EF4-FFF2-40B4-BE49-F238E27FC236}">
+                <a16:creationId xmlns:a16="http://schemas.microsoft.com/office/drawing/2014/main" id="{6EFA08E1-823F-3FD7-0376-E7B2F598255F}"/>
               </a:ext>
             </a:extLst>
           </p:cNvPr>
@@ -18690,8 +18419,8 @@
         </p:nvSpPr>
         <p:spPr>
           <a:xfrm>
-            <a:off x="3394633" y="962405"/>
-            <a:ext cx="1300356" cy="369332"/>
+            <a:off x="7278001" y="2323496"/>
+            <a:ext cx="4273927" cy="1600438"/>
           </a:xfrm>
           <a:prstGeom prst="rect">
             <a:avLst/>
@@ -18705,78 +18434,12 @@
           <a:lstStyle/>
           <a:p>
             <a:r>
-              <a:rPr lang="en-US" i="1" dirty="0" err="1"/>
-              <a:t>Bartelt</a:t>
-            </a:r>
-            <a:r>
-              <a:rPr lang="en-US" i="1" dirty="0"/>
-              <a:t> Lab</a:t>
-            </a:r>
-          </a:p>
-        </p:txBody>
-      </p:sp>
-      <p:pic>
-        <p:nvPicPr>
-          <p:cNvPr id="17" name="Picture 16">
-            <a:extLst>
-              <a:ext uri="{FF2B5EF4-FFF2-40B4-BE49-F238E27FC236}">
-                <a16:creationId xmlns:a16="http://schemas.microsoft.com/office/drawing/2014/main" id="{DBAC271A-48A3-9275-731B-9A3EB64402F3}"/>
-              </a:ext>
-            </a:extLst>
-          </p:cNvPr>
-          <p:cNvPicPr>
-            <a:picLocks noChangeAspect="1"/>
-          </p:cNvPicPr>
-          <p:nvPr/>
-        </p:nvPicPr>
-        <p:blipFill>
-          <a:blip r:embed="rId6"/>
-          <a:stretch>
-            <a:fillRect/>
-          </a:stretch>
-        </p:blipFill>
-        <p:spPr>
-          <a:xfrm>
-            <a:off x="4694989" y="728311"/>
-            <a:ext cx="546258" cy="552396"/>
-          </a:xfrm>
-          <a:prstGeom prst="rect">
-            <a:avLst/>
-          </a:prstGeom>
-        </p:spPr>
-      </p:pic>
-      <p:sp>
-        <p:nvSpPr>
-          <p:cNvPr id="20" name="TextBox 19">
-            <a:extLst>
-              <a:ext uri="{FF2B5EF4-FFF2-40B4-BE49-F238E27FC236}">
-                <a16:creationId xmlns:a16="http://schemas.microsoft.com/office/drawing/2014/main" id="{6EFA08E1-823F-3FD7-0376-E7B2F598255F}"/>
-              </a:ext>
-            </a:extLst>
-          </p:cNvPr>
-          <p:cNvSpPr txBox="1"/>
-          <p:nvPr/>
-        </p:nvSpPr>
-        <p:spPr>
-          <a:xfrm>
-            <a:off x="7267727" y="4891199"/>
-            <a:ext cx="3876382" cy="1169551"/>
-          </a:xfrm>
-          <a:prstGeom prst="rect">
-            <a:avLst/>
-          </a:prstGeom>
-          <a:noFill/>
-        </p:spPr>
-        <p:txBody>
-          <a:bodyPr wrap="none" rtlCol="0">
-            <a:spAutoFit/>
-          </a:bodyPr>
-          <a:lstStyle/>
-          <a:p>
-            <a:r>
               <a:rPr lang="en-US" sz="1400" b="1" dirty="0"/>
-              <a:t>points of interest:</a:t>
-            </a:r>
+              <a:t>Scientific questions:</a:t>
+            </a:r>
+          </a:p>
+          <a:p>
+            <a:endParaRPr lang="en-US" sz="1400" b="1" dirty="0"/>
           </a:p>
           <a:p>
             <a:pPr marL="285750" indent="-285750">
@@ -18795,7 +18458,14 @@
             </a:pPr>
             <a:r>
               <a:rPr lang="en-US" sz="1400" dirty="0"/>
-              <a:t>possible metabolic induced changes</a:t>
+              <a:t>possible metabolic induced changes reflected in</a:t>
+            </a:r>
+            <a:br>
+              <a:rPr lang="en-US" sz="1400" dirty="0"/>
+            </a:br>
+            <a:r>
+              <a:rPr lang="en-US" sz="1400" dirty="0"/>
+              <a:t>multi-omics data</a:t>
             </a:r>
           </a:p>
           <a:p>
@@ -18991,7 +18661,7 @@
                             </p:stCondLst>
                             <p:childTnLst>
                               <p:par>
-                                <p:cTn id="18" presetID="1" presetClass="entr" presetSubtype="0" fill="hold" nodeType="clickEffect">
+                                <p:cTn id="18" presetID="1" presetClass="entr" presetSubtype="0" fill="hold" grpId="0" nodeType="clickEffect">
                                   <p:stCondLst>
                                     <p:cond delay="0"/>
                                   </p:stCondLst>
@@ -18999,51 +18669,6 @@
                                     <p:set>
                                       <p:cBhvr>
                                         <p:cTn id="19" dur="1" fill="hold">
-                                          <p:stCondLst>
-                                            <p:cond delay="0"/>
-                                          </p:stCondLst>
-                                        </p:cTn>
-                                        <p:tgtEl>
-                                          <p:spTgt spid="18"/>
-                                        </p:tgtEl>
-                                        <p:attrNameLst>
-                                          <p:attrName>style.visibility</p:attrName>
-                                        </p:attrNameLst>
-                                      </p:cBhvr>
-                                      <p:to>
-                                        <p:strVal val="visible"/>
-                                      </p:to>
-                                    </p:set>
-                                  </p:childTnLst>
-                                </p:cTn>
-                              </p:par>
-                            </p:childTnLst>
-                          </p:cTn>
-                        </p:par>
-                      </p:childTnLst>
-                    </p:cTn>
-                  </p:par>
-                  <p:par>
-                    <p:cTn id="20" fill="hold">
-                      <p:stCondLst>
-                        <p:cond delay="indefinite"/>
-                      </p:stCondLst>
-                      <p:childTnLst>
-                        <p:par>
-                          <p:cTn id="21" fill="hold">
-                            <p:stCondLst>
-                              <p:cond delay="0"/>
-                            </p:stCondLst>
-                            <p:childTnLst>
-                              <p:par>
-                                <p:cTn id="22" presetID="1" presetClass="entr" presetSubtype="0" fill="hold" grpId="0" nodeType="clickEffect">
-                                  <p:stCondLst>
-                                    <p:cond delay="0"/>
-                                  </p:stCondLst>
-                                  <p:childTnLst>
-                                    <p:set>
-                                      <p:cBhvr>
-                                        <p:cTn id="23" dur="1" fill="hold">
                                           <p:stCondLst>
                                             <p:cond delay="0"/>
                                           </p:stCondLst>
@@ -19141,18 +18766,48 @@
           <a:lstStyle/>
           <a:p>
             <a:r>
-              <a:rPr lang="en-US"/>
-              <a:t>Available data</a:t>
+              <a:rPr lang="en-US" dirty="0"/>
+              <a:t>Data</a:t>
             </a:r>
           </a:p>
         </p:txBody>
       </p:sp>
+      <p:pic>
+        <p:nvPicPr>
+          <p:cNvPr id="23" name="Picture 22" descr="Z-scored PCA">
+            <a:extLst>
+              <a:ext uri="{FF2B5EF4-FFF2-40B4-BE49-F238E27FC236}">
+                <a16:creationId xmlns:a16="http://schemas.microsoft.com/office/drawing/2014/main" id="{74B10984-737C-E56D-A6DD-D84537E70F2D}"/>
+              </a:ext>
+            </a:extLst>
+          </p:cNvPr>
+          <p:cNvPicPr>
+            <a:picLocks noChangeAspect="1"/>
+          </p:cNvPicPr>
+          <p:nvPr/>
+        </p:nvPicPr>
+        <p:blipFill>
+          <a:blip r:embed="rId3"/>
+          <a:stretch>
+            <a:fillRect/>
+          </a:stretch>
+        </p:blipFill>
+        <p:spPr>
+          <a:xfrm>
+            <a:off x="6607213" y="620764"/>
+            <a:ext cx="5034227" cy="3108435"/>
+          </a:xfrm>
+          <a:prstGeom prst="rect">
+            <a:avLst/>
+          </a:prstGeom>
+        </p:spPr>
+      </p:pic>
       <p:grpSp>
         <p:nvGrpSpPr>
-          <p:cNvPr id="22" name="Group 21">
-            <a:extLst>
-              <a:ext uri="{FF2B5EF4-FFF2-40B4-BE49-F238E27FC236}">
-                <a16:creationId xmlns:a16="http://schemas.microsoft.com/office/drawing/2014/main" id="{0226FA68-D4C9-10F4-A680-A3CE8DC0FA6A}"/>
+          <p:cNvPr id="38" name="Group 37">
+            <a:extLst>
+              <a:ext uri="{FF2B5EF4-FFF2-40B4-BE49-F238E27FC236}">
+                <a16:creationId xmlns:a16="http://schemas.microsoft.com/office/drawing/2014/main" id="{C62ECE7A-CE9B-C7F3-B23C-30D604236F1A}"/>
               </a:ext>
             </a:extLst>
           </p:cNvPr>
@@ -19161,18 +18816,18 @@
         </p:nvGrpSpPr>
         <p:grpSpPr>
           <a:xfrm>
-            <a:off x="3063014" y="1770372"/>
-            <a:ext cx="2513351" cy="998133"/>
-            <a:chOff x="2965043" y="1737715"/>
-            <a:chExt cx="2513351" cy="998133"/>
+            <a:off x="1029807" y="4361188"/>
+            <a:ext cx="4715610" cy="2218185"/>
+            <a:chOff x="3439700" y="3551087"/>
+            <a:chExt cx="4715610" cy="2218185"/>
           </a:xfrm>
         </p:grpSpPr>
         <p:grpSp>
           <p:nvGrpSpPr>
-            <p:cNvPr id="16" name="Group 15">
+            <p:cNvPr id="22" name="Group 21">
               <a:extLst>
                 <a:ext uri="{FF2B5EF4-FFF2-40B4-BE49-F238E27FC236}">
-                  <a16:creationId xmlns:a16="http://schemas.microsoft.com/office/drawing/2014/main" id="{EA10D7DE-F0A0-4318-B056-46929C88C36F}"/>
+                  <a16:creationId xmlns:a16="http://schemas.microsoft.com/office/drawing/2014/main" id="{0226FA68-D4C9-10F4-A680-A3CE8DC0FA6A}"/>
                 </a:ext>
               </a:extLst>
             </p:cNvPr>
@@ -19181,694 +18836,1049 @@
           </p:nvGrpSpPr>
           <p:grpSpPr>
             <a:xfrm>
-              <a:off x="3744685" y="1737715"/>
-              <a:ext cx="936172" cy="936172"/>
-              <a:chOff x="6433458" y="1480457"/>
-              <a:chExt cx="936172" cy="936172"/>
+              <a:off x="5415796" y="4148962"/>
+              <a:ext cx="2513351" cy="998133"/>
+              <a:chOff x="2965043" y="1737715"/>
+              <a:chExt cx="2513351" cy="998133"/>
             </a:xfrm>
-            <a:solidFill>
-              <a:srgbClr val="00C8CB"/>
-            </a:solidFill>
           </p:grpSpPr>
-          <p:sp>
-            <p:nvSpPr>
-              <p:cNvPr id="2" name="Pie 1">
+          <p:grpSp>
+            <p:nvGrpSpPr>
+              <p:cNvPr id="16" name="Group 15">
                 <a:extLst>
                   <a:ext uri="{FF2B5EF4-FFF2-40B4-BE49-F238E27FC236}">
-                    <a16:creationId xmlns:a16="http://schemas.microsoft.com/office/drawing/2014/main" id="{1EA994C7-F1D4-272E-B767-3F54419A72C0}"/>
+                    <a16:creationId xmlns:a16="http://schemas.microsoft.com/office/drawing/2014/main" id="{EA10D7DE-F0A0-4318-B056-46929C88C36F}"/>
                   </a:ext>
                 </a:extLst>
               </p:cNvPr>
-              <p:cNvSpPr/>
+              <p:cNvGrpSpPr/>
+              <p:nvPr/>
+            </p:nvGrpSpPr>
+            <p:grpSpPr>
+              <a:xfrm>
+                <a:off x="3744685" y="1737715"/>
+                <a:ext cx="936172" cy="936172"/>
+                <a:chOff x="6433458" y="1480457"/>
+                <a:chExt cx="936172" cy="936172"/>
+              </a:xfrm>
+              <a:solidFill>
+                <a:srgbClr val="00C8CB"/>
+              </a:solidFill>
+            </p:grpSpPr>
+            <p:sp>
+              <p:nvSpPr>
+                <p:cNvPr id="2" name="Pie 1">
+                  <a:extLst>
+                    <a:ext uri="{FF2B5EF4-FFF2-40B4-BE49-F238E27FC236}">
+                      <a16:creationId xmlns:a16="http://schemas.microsoft.com/office/drawing/2014/main" id="{1EA994C7-F1D4-272E-B767-3F54419A72C0}"/>
+                    </a:ext>
+                  </a:extLst>
+                </p:cNvPr>
+                <p:cNvSpPr/>
+                <p:nvPr/>
+              </p:nvSpPr>
+              <p:spPr>
+                <a:xfrm>
+                  <a:off x="6433458" y="1480457"/>
+                  <a:ext cx="936172" cy="936172"/>
+                </a:xfrm>
+                <a:prstGeom prst="pie">
+                  <a:avLst>
+                    <a:gd name="adj1" fmla="val 14626644"/>
+                    <a:gd name="adj2" fmla="val 16200000"/>
+                  </a:avLst>
+                </a:prstGeom>
+                <a:grpFill/>
+              </p:spPr>
+              <p:style>
+                <a:lnRef idx="2">
+                  <a:schemeClr val="accent1">
+                    <a:shade val="50000"/>
+                  </a:schemeClr>
+                </a:lnRef>
+                <a:fillRef idx="1">
+                  <a:schemeClr val="accent1"/>
+                </a:fillRef>
+                <a:effectRef idx="0">
+                  <a:schemeClr val="accent1"/>
+                </a:effectRef>
+                <a:fontRef idx="minor">
+                  <a:schemeClr val="lt1"/>
+                </a:fontRef>
+              </p:style>
+              <p:txBody>
+                <a:bodyPr rtlCol="0" anchor="ctr"/>
+                <a:lstStyle/>
+                <a:p>
+                  <a:pPr algn="ctr"/>
+                  <a:endParaRPr lang="en-US">
+                    <a:solidFill>
+                      <a:schemeClr val="tx1"/>
+                    </a:solidFill>
+                  </a:endParaRPr>
+                </a:p>
+              </p:txBody>
+            </p:sp>
+            <p:sp>
+              <p:nvSpPr>
+                <p:cNvPr id="3" name="Pie 2">
+                  <a:extLst>
+                    <a:ext uri="{FF2B5EF4-FFF2-40B4-BE49-F238E27FC236}">
+                      <a16:creationId xmlns:a16="http://schemas.microsoft.com/office/drawing/2014/main" id="{7FF0E924-F9DC-DD7D-7C56-DDF8BB70CFD5}"/>
+                    </a:ext>
+                  </a:extLst>
+                </p:cNvPr>
+                <p:cNvSpPr/>
+                <p:nvPr/>
+              </p:nvSpPr>
+              <p:spPr>
+                <a:xfrm>
+                  <a:off x="6433458" y="1480457"/>
+                  <a:ext cx="936172" cy="936172"/>
+                </a:xfrm>
+                <a:prstGeom prst="pie">
+                  <a:avLst>
+                    <a:gd name="adj1" fmla="val 12684202"/>
+                    <a:gd name="adj2" fmla="val 14242557"/>
+                  </a:avLst>
+                </a:prstGeom>
+                <a:grpFill/>
+              </p:spPr>
+              <p:style>
+                <a:lnRef idx="2">
+                  <a:schemeClr val="accent1">
+                    <a:shade val="50000"/>
+                  </a:schemeClr>
+                </a:lnRef>
+                <a:fillRef idx="1">
+                  <a:schemeClr val="accent1"/>
+                </a:fillRef>
+                <a:effectRef idx="0">
+                  <a:schemeClr val="accent1"/>
+                </a:effectRef>
+                <a:fontRef idx="minor">
+                  <a:schemeClr val="lt1"/>
+                </a:fontRef>
+              </p:style>
+              <p:txBody>
+                <a:bodyPr rtlCol="0" anchor="ctr"/>
+                <a:lstStyle/>
+                <a:p>
+                  <a:pPr algn="ctr"/>
+                  <a:endParaRPr lang="en-US">
+                    <a:solidFill>
+                      <a:schemeClr val="tx1"/>
+                    </a:solidFill>
+                  </a:endParaRPr>
+                </a:p>
+              </p:txBody>
+            </p:sp>
+            <p:sp>
+              <p:nvSpPr>
+                <p:cNvPr id="4" name="Pie 3">
+                  <a:extLst>
+                    <a:ext uri="{FF2B5EF4-FFF2-40B4-BE49-F238E27FC236}">
+                      <a16:creationId xmlns:a16="http://schemas.microsoft.com/office/drawing/2014/main" id="{6BF164F0-D2BB-8348-6FD4-2DA683DD7173}"/>
+                    </a:ext>
+                  </a:extLst>
+                </p:cNvPr>
+                <p:cNvSpPr/>
+                <p:nvPr/>
+              </p:nvSpPr>
+              <p:spPr>
+                <a:xfrm>
+                  <a:off x="6433458" y="1480457"/>
+                  <a:ext cx="936172" cy="936172"/>
+                </a:xfrm>
+                <a:prstGeom prst="pie">
+                  <a:avLst>
+                    <a:gd name="adj1" fmla="val 10795901"/>
+                    <a:gd name="adj2" fmla="val 12384575"/>
+                  </a:avLst>
+                </a:prstGeom>
+                <a:grpFill/>
+              </p:spPr>
+              <p:style>
+                <a:lnRef idx="2">
+                  <a:schemeClr val="accent1">
+                    <a:shade val="50000"/>
+                  </a:schemeClr>
+                </a:lnRef>
+                <a:fillRef idx="1">
+                  <a:schemeClr val="accent1"/>
+                </a:fillRef>
+                <a:effectRef idx="0">
+                  <a:schemeClr val="accent1"/>
+                </a:effectRef>
+                <a:fontRef idx="minor">
+                  <a:schemeClr val="lt1"/>
+                </a:fontRef>
+              </p:style>
+              <p:txBody>
+                <a:bodyPr rtlCol="0" anchor="ctr"/>
+                <a:lstStyle/>
+                <a:p>
+                  <a:pPr algn="ctr"/>
+                  <a:endParaRPr lang="en-US">
+                    <a:solidFill>
+                      <a:schemeClr val="tx1"/>
+                    </a:solidFill>
+                  </a:endParaRPr>
+                </a:p>
+              </p:txBody>
+            </p:sp>
+            <p:sp>
+              <p:nvSpPr>
+                <p:cNvPr id="5" name="Pie 4">
+                  <a:extLst>
+                    <a:ext uri="{FF2B5EF4-FFF2-40B4-BE49-F238E27FC236}">
+                      <a16:creationId xmlns:a16="http://schemas.microsoft.com/office/drawing/2014/main" id="{EFAB11B0-1156-6BA1-4A50-22E4C85D7AA0}"/>
+                    </a:ext>
+                  </a:extLst>
+                </p:cNvPr>
+                <p:cNvSpPr/>
+                <p:nvPr/>
+              </p:nvSpPr>
+              <p:spPr>
+                <a:xfrm rot="16200000">
+                  <a:off x="6433458" y="1480457"/>
+                  <a:ext cx="936172" cy="936172"/>
+                </a:xfrm>
+                <a:prstGeom prst="pie">
+                  <a:avLst>
+                    <a:gd name="adj1" fmla="val 14626644"/>
+                    <a:gd name="adj2" fmla="val 16200000"/>
+                  </a:avLst>
+                </a:prstGeom>
+                <a:grpFill/>
+              </p:spPr>
+              <p:style>
+                <a:lnRef idx="2">
+                  <a:schemeClr val="accent1">
+                    <a:shade val="50000"/>
+                  </a:schemeClr>
+                </a:lnRef>
+                <a:fillRef idx="1">
+                  <a:schemeClr val="accent1"/>
+                </a:fillRef>
+                <a:effectRef idx="0">
+                  <a:schemeClr val="accent1"/>
+                </a:effectRef>
+                <a:fontRef idx="minor">
+                  <a:schemeClr val="lt1"/>
+                </a:fontRef>
+              </p:style>
+              <p:txBody>
+                <a:bodyPr rtlCol="0" anchor="ctr"/>
+                <a:lstStyle/>
+                <a:p>
+                  <a:pPr algn="ctr"/>
+                  <a:endParaRPr lang="en-US">
+                    <a:solidFill>
+                      <a:schemeClr val="tx1"/>
+                    </a:solidFill>
+                  </a:endParaRPr>
+                </a:p>
+              </p:txBody>
+            </p:sp>
+            <p:sp>
+              <p:nvSpPr>
+                <p:cNvPr id="6" name="Pie 5">
+                  <a:extLst>
+                    <a:ext uri="{FF2B5EF4-FFF2-40B4-BE49-F238E27FC236}">
+                      <a16:creationId xmlns:a16="http://schemas.microsoft.com/office/drawing/2014/main" id="{9885AAF1-2668-F0FE-B0E9-A17DFD03A3E3}"/>
+                    </a:ext>
+                  </a:extLst>
+                </p:cNvPr>
+                <p:cNvSpPr/>
+                <p:nvPr/>
+              </p:nvSpPr>
+              <p:spPr>
+                <a:xfrm rot="16200000">
+                  <a:off x="6433458" y="1480457"/>
+                  <a:ext cx="936172" cy="936172"/>
+                </a:xfrm>
+                <a:prstGeom prst="pie">
+                  <a:avLst>
+                    <a:gd name="adj1" fmla="val 12684202"/>
+                    <a:gd name="adj2" fmla="val 14242557"/>
+                  </a:avLst>
+                </a:prstGeom>
+                <a:grpFill/>
+              </p:spPr>
+              <p:style>
+                <a:lnRef idx="2">
+                  <a:schemeClr val="accent1">
+                    <a:shade val="50000"/>
+                  </a:schemeClr>
+                </a:lnRef>
+                <a:fillRef idx="1">
+                  <a:schemeClr val="accent1"/>
+                </a:fillRef>
+                <a:effectRef idx="0">
+                  <a:schemeClr val="accent1"/>
+                </a:effectRef>
+                <a:fontRef idx="minor">
+                  <a:schemeClr val="lt1"/>
+                </a:fontRef>
+              </p:style>
+              <p:txBody>
+                <a:bodyPr rtlCol="0" anchor="ctr"/>
+                <a:lstStyle/>
+                <a:p>
+                  <a:pPr algn="ctr"/>
+                  <a:endParaRPr lang="en-US">
+                    <a:solidFill>
+                      <a:schemeClr val="tx1"/>
+                    </a:solidFill>
+                  </a:endParaRPr>
+                </a:p>
+              </p:txBody>
+            </p:sp>
+            <p:sp>
+              <p:nvSpPr>
+                <p:cNvPr id="7" name="Pie 6">
+                  <a:extLst>
+                    <a:ext uri="{FF2B5EF4-FFF2-40B4-BE49-F238E27FC236}">
+                      <a16:creationId xmlns:a16="http://schemas.microsoft.com/office/drawing/2014/main" id="{62383856-F347-C63D-198E-A2104355C8C8}"/>
+                    </a:ext>
+                  </a:extLst>
+                </p:cNvPr>
+                <p:cNvSpPr/>
+                <p:nvPr/>
+              </p:nvSpPr>
+              <p:spPr>
+                <a:xfrm rot="16200000">
+                  <a:off x="6433458" y="1480457"/>
+                  <a:ext cx="936172" cy="936172"/>
+                </a:xfrm>
+                <a:prstGeom prst="pie">
+                  <a:avLst>
+                    <a:gd name="adj1" fmla="val 10795901"/>
+                    <a:gd name="adj2" fmla="val 12384575"/>
+                  </a:avLst>
+                </a:prstGeom>
+                <a:grpFill/>
+              </p:spPr>
+              <p:style>
+                <a:lnRef idx="2">
+                  <a:schemeClr val="accent1">
+                    <a:shade val="50000"/>
+                  </a:schemeClr>
+                </a:lnRef>
+                <a:fillRef idx="1">
+                  <a:schemeClr val="accent1"/>
+                </a:fillRef>
+                <a:effectRef idx="0">
+                  <a:schemeClr val="accent1"/>
+                </a:effectRef>
+                <a:fontRef idx="minor">
+                  <a:schemeClr val="lt1"/>
+                </a:fontRef>
+              </p:style>
+              <p:txBody>
+                <a:bodyPr rtlCol="0" anchor="ctr"/>
+                <a:lstStyle/>
+                <a:p>
+                  <a:pPr algn="ctr"/>
+                  <a:endParaRPr lang="en-US">
+                    <a:solidFill>
+                      <a:schemeClr val="tx1"/>
+                    </a:solidFill>
+                  </a:endParaRPr>
+                </a:p>
+              </p:txBody>
+            </p:sp>
+          </p:grpSp>
+          <p:grpSp>
+            <p:nvGrpSpPr>
+              <p:cNvPr id="15" name="Group 14">
+                <a:extLst>
+                  <a:ext uri="{FF2B5EF4-FFF2-40B4-BE49-F238E27FC236}">
+                    <a16:creationId xmlns:a16="http://schemas.microsoft.com/office/drawing/2014/main" id="{15D08A90-86D5-4CFE-674C-8441BBAA5553}"/>
+                  </a:ext>
+                </a:extLst>
+              </p:cNvPr>
+              <p:cNvGrpSpPr/>
+              <p:nvPr/>
+            </p:nvGrpSpPr>
+            <p:grpSpPr>
+              <a:xfrm>
+                <a:off x="3831771" y="1737715"/>
+                <a:ext cx="936172" cy="936172"/>
+                <a:chOff x="6585858" y="1632857"/>
+                <a:chExt cx="936172" cy="936172"/>
+              </a:xfrm>
+              <a:solidFill>
+                <a:srgbClr val="FF6C67"/>
+              </a:solidFill>
+            </p:grpSpPr>
+            <p:sp>
+              <p:nvSpPr>
+                <p:cNvPr id="8" name="Pie 7">
+                  <a:extLst>
+                    <a:ext uri="{FF2B5EF4-FFF2-40B4-BE49-F238E27FC236}">
+                      <a16:creationId xmlns:a16="http://schemas.microsoft.com/office/drawing/2014/main" id="{545457C5-FBB1-1296-83FF-36DDE48F05C9}"/>
+                    </a:ext>
+                  </a:extLst>
+                </p:cNvPr>
+                <p:cNvSpPr/>
+                <p:nvPr/>
+              </p:nvSpPr>
+              <p:spPr>
+                <a:xfrm rot="10800000">
+                  <a:off x="6585858" y="1632857"/>
+                  <a:ext cx="936172" cy="936172"/>
+                </a:xfrm>
+                <a:prstGeom prst="pie">
+                  <a:avLst>
+                    <a:gd name="adj1" fmla="val 14626644"/>
+                    <a:gd name="adj2" fmla="val 16200000"/>
+                  </a:avLst>
+                </a:prstGeom>
+                <a:grpFill/>
+              </p:spPr>
+              <p:style>
+                <a:lnRef idx="2">
+                  <a:schemeClr val="accent1">
+                    <a:shade val="50000"/>
+                  </a:schemeClr>
+                </a:lnRef>
+                <a:fillRef idx="1">
+                  <a:schemeClr val="accent1"/>
+                </a:fillRef>
+                <a:effectRef idx="0">
+                  <a:schemeClr val="accent1"/>
+                </a:effectRef>
+                <a:fontRef idx="minor">
+                  <a:schemeClr val="lt1"/>
+                </a:fontRef>
+              </p:style>
+              <p:txBody>
+                <a:bodyPr rtlCol="0" anchor="ctr"/>
+                <a:lstStyle/>
+                <a:p>
+                  <a:pPr algn="ctr"/>
+                  <a:endParaRPr lang="en-US">
+                    <a:solidFill>
+                      <a:schemeClr val="tx1"/>
+                    </a:solidFill>
+                  </a:endParaRPr>
+                </a:p>
+              </p:txBody>
+            </p:sp>
+            <p:sp>
+              <p:nvSpPr>
+                <p:cNvPr id="9" name="Pie 8">
+                  <a:extLst>
+                    <a:ext uri="{FF2B5EF4-FFF2-40B4-BE49-F238E27FC236}">
+                      <a16:creationId xmlns:a16="http://schemas.microsoft.com/office/drawing/2014/main" id="{999B9D3D-B95F-C899-C364-0958ED92BF29}"/>
+                    </a:ext>
+                  </a:extLst>
+                </p:cNvPr>
+                <p:cNvSpPr/>
+                <p:nvPr/>
+              </p:nvSpPr>
+              <p:spPr>
+                <a:xfrm rot="10800000">
+                  <a:off x="6585858" y="1632857"/>
+                  <a:ext cx="936172" cy="936172"/>
+                </a:xfrm>
+                <a:prstGeom prst="pie">
+                  <a:avLst>
+                    <a:gd name="adj1" fmla="val 12684202"/>
+                    <a:gd name="adj2" fmla="val 14242557"/>
+                  </a:avLst>
+                </a:prstGeom>
+                <a:grpFill/>
+              </p:spPr>
+              <p:style>
+                <a:lnRef idx="2">
+                  <a:schemeClr val="accent1">
+                    <a:shade val="50000"/>
+                  </a:schemeClr>
+                </a:lnRef>
+                <a:fillRef idx="1">
+                  <a:schemeClr val="accent1"/>
+                </a:fillRef>
+                <a:effectRef idx="0">
+                  <a:schemeClr val="accent1"/>
+                </a:effectRef>
+                <a:fontRef idx="minor">
+                  <a:schemeClr val="lt1"/>
+                </a:fontRef>
+              </p:style>
+              <p:txBody>
+                <a:bodyPr rtlCol="0" anchor="ctr"/>
+                <a:lstStyle/>
+                <a:p>
+                  <a:pPr algn="ctr"/>
+                  <a:endParaRPr lang="en-US">
+                    <a:solidFill>
+                      <a:schemeClr val="tx1"/>
+                    </a:solidFill>
+                  </a:endParaRPr>
+                </a:p>
+              </p:txBody>
+            </p:sp>
+            <p:sp>
+              <p:nvSpPr>
+                <p:cNvPr id="10" name="Pie 9">
+                  <a:extLst>
+                    <a:ext uri="{FF2B5EF4-FFF2-40B4-BE49-F238E27FC236}">
+                      <a16:creationId xmlns:a16="http://schemas.microsoft.com/office/drawing/2014/main" id="{D3FAEFD5-2652-E91B-7648-4023AA608935}"/>
+                    </a:ext>
+                  </a:extLst>
+                </p:cNvPr>
+                <p:cNvSpPr/>
+                <p:nvPr/>
+              </p:nvSpPr>
+              <p:spPr>
+                <a:xfrm rot="10800000">
+                  <a:off x="6585858" y="1632857"/>
+                  <a:ext cx="936172" cy="936172"/>
+                </a:xfrm>
+                <a:prstGeom prst="pie">
+                  <a:avLst>
+                    <a:gd name="adj1" fmla="val 10795901"/>
+                    <a:gd name="adj2" fmla="val 12384575"/>
+                  </a:avLst>
+                </a:prstGeom>
+                <a:grpFill/>
+              </p:spPr>
+              <p:style>
+                <a:lnRef idx="2">
+                  <a:schemeClr val="accent1">
+                    <a:shade val="50000"/>
+                  </a:schemeClr>
+                </a:lnRef>
+                <a:fillRef idx="1">
+                  <a:schemeClr val="accent1"/>
+                </a:fillRef>
+                <a:effectRef idx="0">
+                  <a:schemeClr val="accent1"/>
+                </a:effectRef>
+                <a:fontRef idx="minor">
+                  <a:schemeClr val="lt1"/>
+                </a:fontRef>
+              </p:style>
+              <p:txBody>
+                <a:bodyPr rtlCol="0" anchor="ctr"/>
+                <a:lstStyle/>
+                <a:p>
+                  <a:pPr algn="ctr"/>
+                  <a:endParaRPr lang="en-US">
+                    <a:solidFill>
+                      <a:schemeClr val="tx1"/>
+                    </a:solidFill>
+                  </a:endParaRPr>
+                </a:p>
+              </p:txBody>
+            </p:sp>
+            <p:sp>
+              <p:nvSpPr>
+                <p:cNvPr id="12" name="Pie 11">
+                  <a:extLst>
+                    <a:ext uri="{FF2B5EF4-FFF2-40B4-BE49-F238E27FC236}">
+                      <a16:creationId xmlns:a16="http://schemas.microsoft.com/office/drawing/2014/main" id="{56D8867F-1245-C68D-14A4-3D87B41AA582}"/>
+                    </a:ext>
+                  </a:extLst>
+                </p:cNvPr>
+                <p:cNvSpPr/>
+                <p:nvPr/>
+              </p:nvSpPr>
+              <p:spPr>
+                <a:xfrm rot="5400000">
+                  <a:off x="6585858" y="1632857"/>
+                  <a:ext cx="936172" cy="936172"/>
+                </a:xfrm>
+                <a:prstGeom prst="pie">
+                  <a:avLst>
+                    <a:gd name="adj1" fmla="val 14626644"/>
+                    <a:gd name="adj2" fmla="val 16200000"/>
+                  </a:avLst>
+                </a:prstGeom>
+                <a:grpFill/>
+              </p:spPr>
+              <p:style>
+                <a:lnRef idx="2">
+                  <a:schemeClr val="accent1">
+                    <a:shade val="50000"/>
+                  </a:schemeClr>
+                </a:lnRef>
+                <a:fillRef idx="1">
+                  <a:schemeClr val="accent1"/>
+                </a:fillRef>
+                <a:effectRef idx="0">
+                  <a:schemeClr val="accent1"/>
+                </a:effectRef>
+                <a:fontRef idx="minor">
+                  <a:schemeClr val="lt1"/>
+                </a:fontRef>
+              </p:style>
+              <p:txBody>
+                <a:bodyPr rtlCol="0" anchor="ctr"/>
+                <a:lstStyle/>
+                <a:p>
+                  <a:pPr algn="ctr"/>
+                  <a:endParaRPr lang="en-US">
+                    <a:solidFill>
+                      <a:schemeClr val="tx1"/>
+                    </a:solidFill>
+                  </a:endParaRPr>
+                </a:p>
+              </p:txBody>
+            </p:sp>
+            <p:sp>
+              <p:nvSpPr>
+                <p:cNvPr id="13" name="Pie 12">
+                  <a:extLst>
+                    <a:ext uri="{FF2B5EF4-FFF2-40B4-BE49-F238E27FC236}">
+                      <a16:creationId xmlns:a16="http://schemas.microsoft.com/office/drawing/2014/main" id="{4BA261DF-DA31-C637-9961-28261CF2A922}"/>
+                    </a:ext>
+                  </a:extLst>
+                </p:cNvPr>
+                <p:cNvSpPr/>
+                <p:nvPr/>
+              </p:nvSpPr>
+              <p:spPr>
+                <a:xfrm rot="5400000">
+                  <a:off x="6585858" y="1632857"/>
+                  <a:ext cx="936172" cy="936172"/>
+                </a:xfrm>
+                <a:prstGeom prst="pie">
+                  <a:avLst>
+                    <a:gd name="adj1" fmla="val 12684202"/>
+                    <a:gd name="adj2" fmla="val 14242557"/>
+                  </a:avLst>
+                </a:prstGeom>
+                <a:grpFill/>
+              </p:spPr>
+              <p:style>
+                <a:lnRef idx="2">
+                  <a:schemeClr val="accent1">
+                    <a:shade val="50000"/>
+                  </a:schemeClr>
+                </a:lnRef>
+                <a:fillRef idx="1">
+                  <a:schemeClr val="accent1"/>
+                </a:fillRef>
+                <a:effectRef idx="0">
+                  <a:schemeClr val="accent1"/>
+                </a:effectRef>
+                <a:fontRef idx="minor">
+                  <a:schemeClr val="lt1"/>
+                </a:fontRef>
+              </p:style>
+              <p:txBody>
+                <a:bodyPr rtlCol="0" anchor="ctr"/>
+                <a:lstStyle/>
+                <a:p>
+                  <a:pPr algn="ctr"/>
+                  <a:endParaRPr lang="en-US">
+                    <a:solidFill>
+                      <a:schemeClr val="tx1"/>
+                    </a:solidFill>
+                  </a:endParaRPr>
+                </a:p>
+              </p:txBody>
+            </p:sp>
+            <p:sp>
+              <p:nvSpPr>
+                <p:cNvPr id="14" name="Pie 13">
+                  <a:extLst>
+                    <a:ext uri="{FF2B5EF4-FFF2-40B4-BE49-F238E27FC236}">
+                      <a16:creationId xmlns:a16="http://schemas.microsoft.com/office/drawing/2014/main" id="{E38B192E-A471-2BEB-EB40-44E01AEEFE7C}"/>
+                    </a:ext>
+                  </a:extLst>
+                </p:cNvPr>
+                <p:cNvSpPr/>
+                <p:nvPr/>
+              </p:nvSpPr>
+              <p:spPr>
+                <a:xfrm rot="5400000">
+                  <a:off x="6585858" y="1632857"/>
+                  <a:ext cx="936172" cy="936172"/>
+                </a:xfrm>
+                <a:prstGeom prst="pie">
+                  <a:avLst>
+                    <a:gd name="adj1" fmla="val 10795901"/>
+                    <a:gd name="adj2" fmla="val 12384575"/>
+                  </a:avLst>
+                </a:prstGeom>
+                <a:grpFill/>
+              </p:spPr>
+              <p:style>
+                <a:lnRef idx="2">
+                  <a:schemeClr val="accent1">
+                    <a:shade val="50000"/>
+                  </a:schemeClr>
+                </a:lnRef>
+                <a:fillRef idx="1">
+                  <a:schemeClr val="accent1"/>
+                </a:fillRef>
+                <a:effectRef idx="0">
+                  <a:schemeClr val="accent1"/>
+                </a:effectRef>
+                <a:fontRef idx="minor">
+                  <a:schemeClr val="lt1"/>
+                </a:fontRef>
+              </p:style>
+              <p:txBody>
+                <a:bodyPr rtlCol="0" anchor="ctr"/>
+                <a:lstStyle/>
+                <a:p>
+                  <a:pPr algn="ctr"/>
+                  <a:endParaRPr lang="en-US">
+                    <a:solidFill>
+                      <a:schemeClr val="tx1"/>
+                    </a:solidFill>
+                  </a:endParaRPr>
+                </a:p>
+              </p:txBody>
+            </p:sp>
+          </p:grpSp>
+          <p:sp>
+            <p:nvSpPr>
+              <p:cNvPr id="18" name="TextBox 17">
+                <a:extLst>
+                  <a:ext uri="{FF2B5EF4-FFF2-40B4-BE49-F238E27FC236}">
+                    <a16:creationId xmlns:a16="http://schemas.microsoft.com/office/drawing/2014/main" id="{C63E8FE3-3026-C429-86DA-390F8C1BBB69}"/>
+                  </a:ext>
+                </a:extLst>
+              </p:cNvPr>
+              <p:cNvSpPr txBox="1"/>
               <p:nvPr/>
             </p:nvSpPr>
             <p:spPr>
               <a:xfrm>
-                <a:off x="6433458" y="1480457"/>
-                <a:ext cx="936172" cy="936172"/>
+                <a:off x="2965043" y="1737715"/>
+                <a:ext cx="736099" cy="369332"/>
               </a:xfrm>
-              <a:prstGeom prst="pie">
-                <a:avLst>
-                  <a:gd name="adj1" fmla="val 14626644"/>
-                  <a:gd name="adj2" fmla="val 16200000"/>
-                </a:avLst>
+              <a:prstGeom prst="rect">
+                <a:avLst/>
               </a:prstGeom>
-              <a:grpFill/>
+              <a:noFill/>
             </p:spPr>
-            <p:style>
-              <a:lnRef idx="2">
-                <a:schemeClr val="accent1">
-                  <a:shade val="50000"/>
-                </a:schemeClr>
-              </a:lnRef>
-              <a:fillRef idx="1">
-                <a:schemeClr val="accent1"/>
-              </a:fillRef>
-              <a:effectRef idx="0">
-                <a:schemeClr val="accent1"/>
-              </a:effectRef>
-              <a:fontRef idx="minor">
-                <a:schemeClr val="lt1"/>
-              </a:fontRef>
-            </p:style>
             <p:txBody>
-              <a:bodyPr rtlCol="0" anchor="ctr"/>
+              <a:bodyPr wrap="none" rtlCol="0">
+                <a:spAutoFit/>
+              </a:bodyPr>
               <a:lstStyle/>
               <a:p>
-                <a:pPr algn="ctr"/>
-                <a:endParaRPr lang="en-US">
-                  <a:solidFill>
-                    <a:schemeClr val="tx1"/>
-                  </a:solidFill>
-                </a:endParaRPr>
+                <a:r>
+                  <a:rPr lang="en-US"/>
+                  <a:t>6 WT</a:t>
+                </a:r>
               </a:p>
             </p:txBody>
           </p:sp>
           <p:sp>
             <p:nvSpPr>
-              <p:cNvPr id="3" name="Pie 2">
+              <p:cNvPr id="19" name="TextBox 18">
                 <a:extLst>
                   <a:ext uri="{FF2B5EF4-FFF2-40B4-BE49-F238E27FC236}">
-                    <a16:creationId xmlns:a16="http://schemas.microsoft.com/office/drawing/2014/main" id="{7FF0E924-F9DC-DD7D-7C56-DDF8BB70CFD5}"/>
+                    <a16:creationId xmlns:a16="http://schemas.microsoft.com/office/drawing/2014/main" id="{FBA6809C-6D38-343F-E806-9C1ACFE29E06}"/>
                   </a:ext>
                 </a:extLst>
               </p:cNvPr>
-              <p:cNvSpPr/>
+              <p:cNvSpPr txBox="1"/>
               <p:nvPr/>
             </p:nvSpPr>
             <p:spPr>
               <a:xfrm>
-                <a:off x="6433458" y="1480457"/>
-                <a:ext cx="936172" cy="936172"/>
+                <a:off x="4767943" y="2366516"/>
+                <a:ext cx="710451" cy="369332"/>
               </a:xfrm>
-              <a:prstGeom prst="pie">
-                <a:avLst>
-                  <a:gd name="adj1" fmla="val 12684202"/>
-                  <a:gd name="adj2" fmla="val 14242557"/>
-                </a:avLst>
+              <a:prstGeom prst="rect">
+                <a:avLst/>
               </a:prstGeom>
-              <a:grpFill/>
+              <a:noFill/>
             </p:spPr>
-            <p:style>
-              <a:lnRef idx="2">
-                <a:schemeClr val="accent1">
-                  <a:shade val="50000"/>
-                </a:schemeClr>
-              </a:lnRef>
-              <a:fillRef idx="1">
-                <a:schemeClr val="accent1"/>
-              </a:fillRef>
-              <a:effectRef idx="0">
-                <a:schemeClr val="accent1"/>
-              </a:effectRef>
-              <a:fontRef idx="minor">
-                <a:schemeClr val="lt1"/>
-              </a:fontRef>
-            </p:style>
             <p:txBody>
-              <a:bodyPr rtlCol="0" anchor="ctr"/>
+              <a:bodyPr wrap="none" rtlCol="0">
+                <a:spAutoFit/>
+              </a:bodyPr>
               <a:lstStyle/>
               <a:p>
-                <a:pPr algn="ctr"/>
-                <a:endParaRPr lang="en-US">
-                  <a:solidFill>
-                    <a:schemeClr val="tx1"/>
-                  </a:solidFill>
-                </a:endParaRPr>
-              </a:p>
-            </p:txBody>
-          </p:sp>
-          <p:sp>
-            <p:nvSpPr>
-              <p:cNvPr id="4" name="Pie 3">
-                <a:extLst>
-                  <a:ext uri="{FF2B5EF4-FFF2-40B4-BE49-F238E27FC236}">
-                    <a16:creationId xmlns:a16="http://schemas.microsoft.com/office/drawing/2014/main" id="{6BF164F0-D2BB-8348-6FD4-2DA683DD7173}"/>
-                  </a:ext>
-                </a:extLst>
-              </p:cNvPr>
-              <p:cNvSpPr/>
-              <p:nvPr/>
-            </p:nvSpPr>
-            <p:spPr>
-              <a:xfrm>
-                <a:off x="6433458" y="1480457"/>
-                <a:ext cx="936172" cy="936172"/>
-              </a:xfrm>
-              <a:prstGeom prst="pie">
-                <a:avLst>
-                  <a:gd name="adj1" fmla="val 10795901"/>
-                  <a:gd name="adj2" fmla="val 12384575"/>
-                </a:avLst>
-              </a:prstGeom>
-              <a:grpFill/>
-            </p:spPr>
-            <p:style>
-              <a:lnRef idx="2">
-                <a:schemeClr val="accent1">
-                  <a:shade val="50000"/>
-                </a:schemeClr>
-              </a:lnRef>
-              <a:fillRef idx="1">
-                <a:schemeClr val="accent1"/>
-              </a:fillRef>
-              <a:effectRef idx="0">
-                <a:schemeClr val="accent1"/>
-              </a:effectRef>
-              <a:fontRef idx="minor">
-                <a:schemeClr val="lt1"/>
-              </a:fontRef>
-            </p:style>
-            <p:txBody>
-              <a:bodyPr rtlCol="0" anchor="ctr"/>
-              <a:lstStyle/>
-              <a:p>
-                <a:pPr algn="ctr"/>
-                <a:endParaRPr lang="en-US">
-                  <a:solidFill>
-                    <a:schemeClr val="tx1"/>
-                  </a:solidFill>
-                </a:endParaRPr>
-              </a:p>
-            </p:txBody>
-          </p:sp>
-          <p:sp>
-            <p:nvSpPr>
-              <p:cNvPr id="5" name="Pie 4">
-                <a:extLst>
-                  <a:ext uri="{FF2B5EF4-FFF2-40B4-BE49-F238E27FC236}">
-                    <a16:creationId xmlns:a16="http://schemas.microsoft.com/office/drawing/2014/main" id="{EFAB11B0-1156-6BA1-4A50-22E4C85D7AA0}"/>
-                  </a:ext>
-                </a:extLst>
-              </p:cNvPr>
-              <p:cNvSpPr/>
-              <p:nvPr/>
-            </p:nvSpPr>
-            <p:spPr>
-              <a:xfrm rot="16200000">
-                <a:off x="6433458" y="1480457"/>
-                <a:ext cx="936172" cy="936172"/>
-              </a:xfrm>
-              <a:prstGeom prst="pie">
-                <a:avLst>
-                  <a:gd name="adj1" fmla="val 14626644"/>
-                  <a:gd name="adj2" fmla="val 16200000"/>
-                </a:avLst>
-              </a:prstGeom>
-              <a:grpFill/>
-            </p:spPr>
-            <p:style>
-              <a:lnRef idx="2">
-                <a:schemeClr val="accent1">
-                  <a:shade val="50000"/>
-                </a:schemeClr>
-              </a:lnRef>
-              <a:fillRef idx="1">
-                <a:schemeClr val="accent1"/>
-              </a:fillRef>
-              <a:effectRef idx="0">
-                <a:schemeClr val="accent1"/>
-              </a:effectRef>
-              <a:fontRef idx="minor">
-                <a:schemeClr val="lt1"/>
-              </a:fontRef>
-            </p:style>
-            <p:txBody>
-              <a:bodyPr rtlCol="0" anchor="ctr"/>
-              <a:lstStyle/>
-              <a:p>
-                <a:pPr algn="ctr"/>
-                <a:endParaRPr lang="en-US">
-                  <a:solidFill>
-                    <a:schemeClr val="tx1"/>
-                  </a:solidFill>
-                </a:endParaRPr>
-              </a:p>
-            </p:txBody>
-          </p:sp>
-          <p:sp>
-            <p:nvSpPr>
-              <p:cNvPr id="6" name="Pie 5">
-                <a:extLst>
-                  <a:ext uri="{FF2B5EF4-FFF2-40B4-BE49-F238E27FC236}">
-                    <a16:creationId xmlns:a16="http://schemas.microsoft.com/office/drawing/2014/main" id="{9885AAF1-2668-F0FE-B0E9-A17DFD03A3E3}"/>
-                  </a:ext>
-                </a:extLst>
-              </p:cNvPr>
-              <p:cNvSpPr/>
-              <p:nvPr/>
-            </p:nvSpPr>
-            <p:spPr>
-              <a:xfrm rot="16200000">
-                <a:off x="6433458" y="1480457"/>
-                <a:ext cx="936172" cy="936172"/>
-              </a:xfrm>
-              <a:prstGeom prst="pie">
-                <a:avLst>
-                  <a:gd name="adj1" fmla="val 12684202"/>
-                  <a:gd name="adj2" fmla="val 14242557"/>
-                </a:avLst>
-              </a:prstGeom>
-              <a:grpFill/>
-            </p:spPr>
-            <p:style>
-              <a:lnRef idx="2">
-                <a:schemeClr val="accent1">
-                  <a:shade val="50000"/>
-                </a:schemeClr>
-              </a:lnRef>
-              <a:fillRef idx="1">
-                <a:schemeClr val="accent1"/>
-              </a:fillRef>
-              <a:effectRef idx="0">
-                <a:schemeClr val="accent1"/>
-              </a:effectRef>
-              <a:fontRef idx="minor">
-                <a:schemeClr val="lt1"/>
-              </a:fontRef>
-            </p:style>
-            <p:txBody>
-              <a:bodyPr rtlCol="0" anchor="ctr"/>
-              <a:lstStyle/>
-              <a:p>
-                <a:pPr algn="ctr"/>
-                <a:endParaRPr lang="en-US">
-                  <a:solidFill>
-                    <a:schemeClr val="tx1"/>
-                  </a:solidFill>
-                </a:endParaRPr>
-              </a:p>
-            </p:txBody>
-          </p:sp>
-          <p:sp>
-            <p:nvSpPr>
-              <p:cNvPr id="7" name="Pie 6">
-                <a:extLst>
-                  <a:ext uri="{FF2B5EF4-FFF2-40B4-BE49-F238E27FC236}">
-                    <a16:creationId xmlns:a16="http://schemas.microsoft.com/office/drawing/2014/main" id="{62383856-F347-C63D-198E-A2104355C8C8}"/>
-                  </a:ext>
-                </a:extLst>
-              </p:cNvPr>
-              <p:cNvSpPr/>
-              <p:nvPr/>
-            </p:nvSpPr>
-            <p:spPr>
-              <a:xfrm rot="16200000">
-                <a:off x="6433458" y="1480457"/>
-                <a:ext cx="936172" cy="936172"/>
-              </a:xfrm>
-              <a:prstGeom prst="pie">
-                <a:avLst>
-                  <a:gd name="adj1" fmla="val 10795901"/>
-                  <a:gd name="adj2" fmla="val 12384575"/>
-                </a:avLst>
-              </a:prstGeom>
-              <a:grpFill/>
-            </p:spPr>
-            <p:style>
-              <a:lnRef idx="2">
-                <a:schemeClr val="accent1">
-                  <a:shade val="50000"/>
-                </a:schemeClr>
-              </a:lnRef>
-              <a:fillRef idx="1">
-                <a:schemeClr val="accent1"/>
-              </a:fillRef>
-              <a:effectRef idx="0">
-                <a:schemeClr val="accent1"/>
-              </a:effectRef>
-              <a:fontRef idx="minor">
-                <a:schemeClr val="lt1"/>
-              </a:fontRef>
-            </p:style>
-            <p:txBody>
-              <a:bodyPr rtlCol="0" anchor="ctr"/>
-              <a:lstStyle/>
-              <a:p>
-                <a:pPr algn="ctr"/>
-                <a:endParaRPr lang="en-US">
-                  <a:solidFill>
-                    <a:schemeClr val="tx1"/>
-                  </a:solidFill>
-                </a:endParaRPr>
-              </a:p>
-            </p:txBody>
-          </p:sp>
-        </p:grpSp>
-        <p:grpSp>
-          <p:nvGrpSpPr>
-            <p:cNvPr id="15" name="Group 14">
-              <a:extLst>
-                <a:ext uri="{FF2B5EF4-FFF2-40B4-BE49-F238E27FC236}">
-                  <a16:creationId xmlns:a16="http://schemas.microsoft.com/office/drawing/2014/main" id="{15D08A90-86D5-4CFE-674C-8441BBAA5553}"/>
-                </a:ext>
-              </a:extLst>
-            </p:cNvPr>
-            <p:cNvGrpSpPr/>
-            <p:nvPr/>
-          </p:nvGrpSpPr>
-          <p:grpSpPr>
-            <a:xfrm>
-              <a:off x="3831771" y="1737715"/>
-              <a:ext cx="936172" cy="936172"/>
-              <a:chOff x="6585858" y="1632857"/>
-              <a:chExt cx="936172" cy="936172"/>
-            </a:xfrm>
-            <a:solidFill>
-              <a:srgbClr val="FF6C67"/>
-            </a:solidFill>
-          </p:grpSpPr>
-          <p:sp>
-            <p:nvSpPr>
-              <p:cNvPr id="8" name="Pie 7">
-                <a:extLst>
-                  <a:ext uri="{FF2B5EF4-FFF2-40B4-BE49-F238E27FC236}">
-                    <a16:creationId xmlns:a16="http://schemas.microsoft.com/office/drawing/2014/main" id="{545457C5-FBB1-1296-83FF-36DDE48F05C9}"/>
-                  </a:ext>
-                </a:extLst>
-              </p:cNvPr>
-              <p:cNvSpPr/>
-              <p:nvPr/>
-            </p:nvSpPr>
-            <p:spPr>
-              <a:xfrm rot="10800000">
-                <a:off x="6585858" y="1632857"/>
-                <a:ext cx="936172" cy="936172"/>
-              </a:xfrm>
-              <a:prstGeom prst="pie">
-                <a:avLst>
-                  <a:gd name="adj1" fmla="val 14626644"/>
-                  <a:gd name="adj2" fmla="val 16200000"/>
-                </a:avLst>
-              </a:prstGeom>
-              <a:grpFill/>
-            </p:spPr>
-            <p:style>
-              <a:lnRef idx="2">
-                <a:schemeClr val="accent1">
-                  <a:shade val="50000"/>
-                </a:schemeClr>
-              </a:lnRef>
-              <a:fillRef idx="1">
-                <a:schemeClr val="accent1"/>
-              </a:fillRef>
-              <a:effectRef idx="0">
-                <a:schemeClr val="accent1"/>
-              </a:effectRef>
-              <a:fontRef idx="minor">
-                <a:schemeClr val="lt1"/>
-              </a:fontRef>
-            </p:style>
-            <p:txBody>
-              <a:bodyPr rtlCol="0" anchor="ctr"/>
-              <a:lstStyle/>
-              <a:p>
-                <a:pPr algn="ctr"/>
-                <a:endParaRPr lang="en-US">
-                  <a:solidFill>
-                    <a:schemeClr val="tx1"/>
-                  </a:solidFill>
-                </a:endParaRPr>
-              </a:p>
-            </p:txBody>
-          </p:sp>
-          <p:sp>
-            <p:nvSpPr>
-              <p:cNvPr id="9" name="Pie 8">
-                <a:extLst>
-                  <a:ext uri="{FF2B5EF4-FFF2-40B4-BE49-F238E27FC236}">
-                    <a16:creationId xmlns:a16="http://schemas.microsoft.com/office/drawing/2014/main" id="{999B9D3D-B95F-C899-C364-0958ED92BF29}"/>
-                  </a:ext>
-                </a:extLst>
-              </p:cNvPr>
-              <p:cNvSpPr/>
-              <p:nvPr/>
-            </p:nvSpPr>
-            <p:spPr>
-              <a:xfrm rot="10800000">
-                <a:off x="6585858" y="1632857"/>
-                <a:ext cx="936172" cy="936172"/>
-              </a:xfrm>
-              <a:prstGeom prst="pie">
-                <a:avLst>
-                  <a:gd name="adj1" fmla="val 12684202"/>
-                  <a:gd name="adj2" fmla="val 14242557"/>
-                </a:avLst>
-              </a:prstGeom>
-              <a:grpFill/>
-            </p:spPr>
-            <p:style>
-              <a:lnRef idx="2">
-                <a:schemeClr val="accent1">
-                  <a:shade val="50000"/>
-                </a:schemeClr>
-              </a:lnRef>
-              <a:fillRef idx="1">
-                <a:schemeClr val="accent1"/>
-              </a:fillRef>
-              <a:effectRef idx="0">
-                <a:schemeClr val="accent1"/>
-              </a:effectRef>
-              <a:fontRef idx="minor">
-                <a:schemeClr val="lt1"/>
-              </a:fontRef>
-            </p:style>
-            <p:txBody>
-              <a:bodyPr rtlCol="0" anchor="ctr"/>
-              <a:lstStyle/>
-              <a:p>
-                <a:pPr algn="ctr"/>
-                <a:endParaRPr lang="en-US">
-                  <a:solidFill>
-                    <a:schemeClr val="tx1"/>
-                  </a:solidFill>
-                </a:endParaRPr>
-              </a:p>
-            </p:txBody>
-          </p:sp>
-          <p:sp>
-            <p:nvSpPr>
-              <p:cNvPr id="10" name="Pie 9">
-                <a:extLst>
-                  <a:ext uri="{FF2B5EF4-FFF2-40B4-BE49-F238E27FC236}">
-                    <a16:creationId xmlns:a16="http://schemas.microsoft.com/office/drawing/2014/main" id="{D3FAEFD5-2652-E91B-7648-4023AA608935}"/>
-                  </a:ext>
-                </a:extLst>
-              </p:cNvPr>
-              <p:cNvSpPr/>
-              <p:nvPr/>
-            </p:nvSpPr>
-            <p:spPr>
-              <a:xfrm rot="10800000">
-                <a:off x="6585858" y="1632857"/>
-                <a:ext cx="936172" cy="936172"/>
-              </a:xfrm>
-              <a:prstGeom prst="pie">
-                <a:avLst>
-                  <a:gd name="adj1" fmla="val 10795901"/>
-                  <a:gd name="adj2" fmla="val 12384575"/>
-                </a:avLst>
-              </a:prstGeom>
-              <a:grpFill/>
-            </p:spPr>
-            <p:style>
-              <a:lnRef idx="2">
-                <a:schemeClr val="accent1">
-                  <a:shade val="50000"/>
-                </a:schemeClr>
-              </a:lnRef>
-              <a:fillRef idx="1">
-                <a:schemeClr val="accent1"/>
-              </a:fillRef>
-              <a:effectRef idx="0">
-                <a:schemeClr val="accent1"/>
-              </a:effectRef>
-              <a:fontRef idx="minor">
-                <a:schemeClr val="lt1"/>
-              </a:fontRef>
-            </p:style>
-            <p:txBody>
-              <a:bodyPr rtlCol="0" anchor="ctr"/>
-              <a:lstStyle/>
-              <a:p>
-                <a:pPr algn="ctr"/>
-                <a:endParaRPr lang="en-US">
-                  <a:solidFill>
-                    <a:schemeClr val="tx1"/>
-                  </a:solidFill>
-                </a:endParaRPr>
-              </a:p>
-            </p:txBody>
-          </p:sp>
-          <p:sp>
-            <p:nvSpPr>
-              <p:cNvPr id="12" name="Pie 11">
-                <a:extLst>
-                  <a:ext uri="{FF2B5EF4-FFF2-40B4-BE49-F238E27FC236}">
-                    <a16:creationId xmlns:a16="http://schemas.microsoft.com/office/drawing/2014/main" id="{56D8867F-1245-C68D-14A4-3D87B41AA582}"/>
-                  </a:ext>
-                </a:extLst>
-              </p:cNvPr>
-              <p:cNvSpPr/>
-              <p:nvPr/>
-            </p:nvSpPr>
-            <p:spPr>
-              <a:xfrm rot="5400000">
-                <a:off x="6585858" y="1632857"/>
-                <a:ext cx="936172" cy="936172"/>
-              </a:xfrm>
-              <a:prstGeom prst="pie">
-                <a:avLst>
-                  <a:gd name="adj1" fmla="val 14626644"/>
-                  <a:gd name="adj2" fmla="val 16200000"/>
-                </a:avLst>
-              </a:prstGeom>
-              <a:grpFill/>
-            </p:spPr>
-            <p:style>
-              <a:lnRef idx="2">
-                <a:schemeClr val="accent1">
-                  <a:shade val="50000"/>
-                </a:schemeClr>
-              </a:lnRef>
-              <a:fillRef idx="1">
-                <a:schemeClr val="accent1"/>
-              </a:fillRef>
-              <a:effectRef idx="0">
-                <a:schemeClr val="accent1"/>
-              </a:effectRef>
-              <a:fontRef idx="minor">
-                <a:schemeClr val="lt1"/>
-              </a:fontRef>
-            </p:style>
-            <p:txBody>
-              <a:bodyPr rtlCol="0" anchor="ctr"/>
-              <a:lstStyle/>
-              <a:p>
-                <a:pPr algn="ctr"/>
-                <a:endParaRPr lang="en-US">
-                  <a:solidFill>
-                    <a:schemeClr val="tx1"/>
-                  </a:solidFill>
-                </a:endParaRPr>
-              </a:p>
-            </p:txBody>
-          </p:sp>
-          <p:sp>
-            <p:nvSpPr>
-              <p:cNvPr id="13" name="Pie 12">
-                <a:extLst>
-                  <a:ext uri="{FF2B5EF4-FFF2-40B4-BE49-F238E27FC236}">
-                    <a16:creationId xmlns:a16="http://schemas.microsoft.com/office/drawing/2014/main" id="{4BA261DF-DA31-C637-9961-28261CF2A922}"/>
-                  </a:ext>
-                </a:extLst>
-              </p:cNvPr>
-              <p:cNvSpPr/>
-              <p:nvPr/>
-            </p:nvSpPr>
-            <p:spPr>
-              <a:xfrm rot="5400000">
-                <a:off x="6585858" y="1632857"/>
-                <a:ext cx="936172" cy="936172"/>
-              </a:xfrm>
-              <a:prstGeom prst="pie">
-                <a:avLst>
-                  <a:gd name="adj1" fmla="val 12684202"/>
-                  <a:gd name="adj2" fmla="val 14242557"/>
-                </a:avLst>
-              </a:prstGeom>
-              <a:grpFill/>
-            </p:spPr>
-            <p:style>
-              <a:lnRef idx="2">
-                <a:schemeClr val="accent1">
-                  <a:shade val="50000"/>
-                </a:schemeClr>
-              </a:lnRef>
-              <a:fillRef idx="1">
-                <a:schemeClr val="accent1"/>
-              </a:fillRef>
-              <a:effectRef idx="0">
-                <a:schemeClr val="accent1"/>
-              </a:effectRef>
-              <a:fontRef idx="minor">
-                <a:schemeClr val="lt1"/>
-              </a:fontRef>
-            </p:style>
-            <p:txBody>
-              <a:bodyPr rtlCol="0" anchor="ctr"/>
-              <a:lstStyle/>
-              <a:p>
-                <a:pPr algn="ctr"/>
-                <a:endParaRPr lang="en-US">
-                  <a:solidFill>
-                    <a:schemeClr val="tx1"/>
-                  </a:solidFill>
-                </a:endParaRPr>
-              </a:p>
-            </p:txBody>
-          </p:sp>
-          <p:sp>
-            <p:nvSpPr>
-              <p:cNvPr id="14" name="Pie 13">
-                <a:extLst>
-                  <a:ext uri="{FF2B5EF4-FFF2-40B4-BE49-F238E27FC236}">
-                    <a16:creationId xmlns:a16="http://schemas.microsoft.com/office/drawing/2014/main" id="{E38B192E-A471-2BEB-EB40-44E01AEEFE7C}"/>
-                  </a:ext>
-                </a:extLst>
-              </p:cNvPr>
-              <p:cNvSpPr/>
-              <p:nvPr/>
-            </p:nvSpPr>
-            <p:spPr>
-              <a:xfrm rot="5400000">
-                <a:off x="6585858" y="1632857"/>
-                <a:ext cx="936172" cy="936172"/>
-              </a:xfrm>
-              <a:prstGeom prst="pie">
-                <a:avLst>
-                  <a:gd name="adj1" fmla="val 10795901"/>
-                  <a:gd name="adj2" fmla="val 12384575"/>
-                </a:avLst>
-              </a:prstGeom>
-              <a:grpFill/>
-            </p:spPr>
-            <p:style>
-              <a:lnRef idx="2">
-                <a:schemeClr val="accent1">
-                  <a:shade val="50000"/>
-                </a:schemeClr>
-              </a:lnRef>
-              <a:fillRef idx="1">
-                <a:schemeClr val="accent1"/>
-              </a:fillRef>
-              <a:effectRef idx="0">
-                <a:schemeClr val="accent1"/>
-              </a:effectRef>
-              <a:fontRef idx="minor">
-                <a:schemeClr val="lt1"/>
-              </a:fontRef>
-            </p:style>
-            <p:txBody>
-              <a:bodyPr rtlCol="0" anchor="ctr"/>
-              <a:lstStyle/>
-              <a:p>
-                <a:pPr algn="ctr"/>
-                <a:endParaRPr lang="en-US">
-                  <a:solidFill>
-                    <a:schemeClr val="tx1"/>
-                  </a:solidFill>
-                </a:endParaRPr>
+                <a:r>
+                  <a:rPr lang="en-US"/>
+                  <a:t>6 KO</a:t>
+                </a:r>
               </a:p>
             </p:txBody>
           </p:sp>
         </p:grpSp>
         <p:sp>
           <p:nvSpPr>
-            <p:cNvPr id="18" name="TextBox 17">
+            <p:cNvPr id="26" name="Textplatzhalter 20">
               <a:extLst>
                 <a:ext uri="{FF2B5EF4-FFF2-40B4-BE49-F238E27FC236}">
-                  <a16:creationId xmlns:a16="http://schemas.microsoft.com/office/drawing/2014/main" id="{C63E8FE3-3026-C429-86DA-390F8C1BBB69}"/>
+                  <a16:creationId xmlns:a16="http://schemas.microsoft.com/office/drawing/2014/main" id="{0C1A886A-50AB-6AE4-E08C-51C2A97A5331}"/>
+                </a:ext>
+              </a:extLst>
+            </p:cNvPr>
+            <p:cNvSpPr txBox="1">
+              <a:spLocks/>
+            </p:cNvSpPr>
+            <p:nvPr/>
+          </p:nvSpPr>
+          <p:spPr>
+            <a:xfrm>
+              <a:off x="3439700" y="3953390"/>
+              <a:ext cx="3593939" cy="1815882"/>
+            </a:xfrm>
+            <a:prstGeom prst="rect">
+              <a:avLst/>
+            </a:prstGeom>
+          </p:spPr>
+          <p:txBody>
+            <a:bodyPr>
+              <a:spAutoFit/>
+            </a:bodyPr>
+            <a:lstStyle>
+              <a:lvl1pPr marL="285750" indent="-285750" algn="l" defTabSz="914400" rtl="0" eaLnBrk="1" latinLnBrk="0" hangingPunct="1">
+                <a:lnSpc>
+                  <a:spcPct val="100000"/>
+                </a:lnSpc>
+                <a:spcBef>
+                  <a:spcPts val="0"/>
+                </a:spcBef>
+                <a:spcAft>
+                  <a:spcPts val="0"/>
+                </a:spcAft>
+                <a:buFont typeface="Arial" panose="020B0604020202020204" pitchFamily="34" charset="0"/>
+                <a:buChar char="•"/>
+                <a:tabLst/>
+                <a:defRPr sz="1600" b="0" i="0" kern="1200" baseline="0">
+                  <a:solidFill>
+                    <a:schemeClr val="tx1"/>
+                  </a:solidFill>
+                  <a:latin typeface="Arial" panose="020B0604020202020204" pitchFamily="34" charset="0"/>
+                  <a:ea typeface="+mn-ea"/>
+                  <a:cs typeface="Arial" panose="020B0604020202020204" pitchFamily="34" charset="0"/>
+                </a:defRPr>
+              </a:lvl1pPr>
+              <a:lvl2pPr marL="358775" indent="-206375" algn="l" defTabSz="914400" rtl="0" eaLnBrk="1" latinLnBrk="0" hangingPunct="1">
+                <a:lnSpc>
+                  <a:spcPct val="100000"/>
+                </a:lnSpc>
+                <a:spcBef>
+                  <a:spcPts val="600"/>
+                </a:spcBef>
+                <a:spcAft>
+                  <a:spcPts val="1000"/>
+                </a:spcAft>
+                <a:buFont typeface="Arial" panose="020B0604020202020204" pitchFamily="34" charset="0"/>
+                <a:buChar char="•"/>
+                <a:tabLst/>
+                <a:defRPr sz="1400" b="0" i="0" kern="1200" baseline="0">
+                  <a:solidFill>
+                    <a:schemeClr val="tx1"/>
+                  </a:solidFill>
+                  <a:latin typeface="Arial" panose="020B0604020202020204" pitchFamily="34" charset="0"/>
+                  <a:ea typeface="+mn-ea"/>
+                  <a:cs typeface="Arial" panose="020B0604020202020204" pitchFamily="34" charset="0"/>
+                </a:defRPr>
+              </a:lvl2pPr>
+              <a:lvl3pPr marL="0" indent="0" algn="l" defTabSz="914400" rtl="0" eaLnBrk="1" latinLnBrk="0" hangingPunct="1">
+                <a:lnSpc>
+                  <a:spcPct val="100000"/>
+                </a:lnSpc>
+                <a:spcBef>
+                  <a:spcPts val="0"/>
+                </a:spcBef>
+                <a:spcAft>
+                  <a:spcPts val="1000"/>
+                </a:spcAft>
+                <a:buFont typeface="Arial" panose="020B0604020202020204" pitchFamily="34" charset="0"/>
+                <a:buChar char="•"/>
+                <a:tabLst/>
+                <a:defRPr sz="1400" b="0" i="0" kern="1200" baseline="0">
+                  <a:solidFill>
+                    <a:schemeClr val="tx1"/>
+                  </a:solidFill>
+                  <a:latin typeface="Arial" panose="020B0604020202020204" pitchFamily="34" charset="0"/>
+                  <a:ea typeface="+mn-ea"/>
+                  <a:cs typeface="Arial" panose="020B0604020202020204" pitchFamily="34" charset="0"/>
+                </a:defRPr>
+              </a:lvl3pPr>
+              <a:lvl4pPr marL="7938" indent="0" algn="l" defTabSz="914400" rtl="0" eaLnBrk="1" latinLnBrk="0" hangingPunct="1">
+                <a:lnSpc>
+                  <a:spcPct val="90000"/>
+                </a:lnSpc>
+                <a:spcBef>
+                  <a:spcPts val="500"/>
+                </a:spcBef>
+                <a:buFont typeface="Arial" panose="020B0604020202020204" pitchFamily="34" charset="0"/>
+                <a:buChar char="•"/>
+                <a:tabLst/>
+                <a:defRPr sz="1400" kern="1200" baseline="0">
+                  <a:solidFill>
+                    <a:schemeClr val="tx1"/>
+                  </a:solidFill>
+                  <a:latin typeface="Arial" panose="020B0604020202020204" pitchFamily="34" charset="0"/>
+                  <a:ea typeface="+mn-ea"/>
+                  <a:cs typeface="+mn-cs"/>
+                </a:defRPr>
+              </a:lvl4pPr>
+              <a:lvl5pPr marL="223838" indent="-215900" algn="l" defTabSz="914400" rtl="0" eaLnBrk="1" latinLnBrk="0" hangingPunct="1">
+                <a:lnSpc>
+                  <a:spcPct val="100000"/>
+                </a:lnSpc>
+                <a:spcBef>
+                  <a:spcPts val="0"/>
+                </a:spcBef>
+                <a:spcAft>
+                  <a:spcPts val="1000"/>
+                </a:spcAft>
+                <a:buClr>
+                  <a:schemeClr val="accent2"/>
+                </a:buClr>
+                <a:buFont typeface="+mj-lt"/>
+                <a:buAutoNum type="arabicPeriod"/>
+                <a:tabLst/>
+                <a:defRPr sz="1400" b="0" i="0" kern="1200" baseline="0">
+                  <a:solidFill>
+                    <a:schemeClr val="tx1"/>
+                  </a:solidFill>
+                  <a:latin typeface="Arial" panose="020B0604020202020204" pitchFamily="34" charset="0"/>
+                  <a:ea typeface="+mn-ea"/>
+                  <a:cs typeface="Arial" panose="020B0604020202020204" pitchFamily="34" charset="0"/>
+                </a:defRPr>
+              </a:lvl5pPr>
+              <a:lvl6pPr marL="223838" indent="-215900" algn="l" defTabSz="914400" rtl="0" eaLnBrk="1" latinLnBrk="0" hangingPunct="1">
+                <a:lnSpc>
+                  <a:spcPct val="100000"/>
+                </a:lnSpc>
+                <a:spcBef>
+                  <a:spcPts val="600"/>
+                </a:spcBef>
+                <a:spcAft>
+                  <a:spcPts val="1000"/>
+                </a:spcAft>
+                <a:buClr>
+                  <a:schemeClr val="accent2"/>
+                </a:buClr>
+                <a:buFont typeface="+mj-lt"/>
+                <a:buAutoNum type="alphaLcPeriod"/>
+                <a:tabLst/>
+                <a:defRPr sz="1400" b="0" i="0" kern="1200">
+                  <a:solidFill>
+                    <a:schemeClr val="tx1"/>
+                  </a:solidFill>
+                  <a:latin typeface="Arial" panose="020B0604020202020204" pitchFamily="34" charset="0"/>
+                  <a:ea typeface="+mn-ea"/>
+                  <a:cs typeface="Arial" panose="020B0604020202020204" pitchFamily="34" charset="0"/>
+                </a:defRPr>
+              </a:lvl6pPr>
+              <a:lvl7pPr marL="2971800" indent="-228600" algn="l" defTabSz="914400" rtl="0" eaLnBrk="1" latinLnBrk="0" hangingPunct="1">
+                <a:lnSpc>
+                  <a:spcPct val="90000"/>
+                </a:lnSpc>
+                <a:spcBef>
+                  <a:spcPts val="500"/>
+                </a:spcBef>
+                <a:buFont typeface="Arial" panose="020B0604020202020204" pitchFamily="34" charset="0"/>
+                <a:buChar char="•"/>
+                <a:defRPr sz="1800" kern="1200">
+                  <a:solidFill>
+                    <a:schemeClr val="tx1"/>
+                  </a:solidFill>
+                  <a:latin typeface="+mn-lt"/>
+                  <a:ea typeface="+mn-ea"/>
+                  <a:cs typeface="+mn-cs"/>
+                </a:defRPr>
+              </a:lvl7pPr>
+              <a:lvl8pPr marL="3429000" indent="-228600" algn="l" defTabSz="914400" rtl="0" eaLnBrk="1" latinLnBrk="0" hangingPunct="1">
+                <a:lnSpc>
+                  <a:spcPct val="90000"/>
+                </a:lnSpc>
+                <a:spcBef>
+                  <a:spcPts val="500"/>
+                </a:spcBef>
+                <a:buFont typeface="Arial" panose="020B0604020202020204" pitchFamily="34" charset="0"/>
+                <a:buChar char="•"/>
+                <a:defRPr sz="1800" kern="1200">
+                  <a:solidFill>
+                    <a:schemeClr val="tx1"/>
+                  </a:solidFill>
+                  <a:latin typeface="+mn-lt"/>
+                  <a:ea typeface="+mn-ea"/>
+                  <a:cs typeface="+mn-cs"/>
+                </a:defRPr>
+              </a:lvl8pPr>
+              <a:lvl9pPr marL="3886200" indent="-228600" algn="l" defTabSz="914400" rtl="0" eaLnBrk="1" latinLnBrk="0" hangingPunct="1">
+                <a:lnSpc>
+                  <a:spcPct val="90000"/>
+                </a:lnSpc>
+                <a:spcBef>
+                  <a:spcPts val="500"/>
+                </a:spcBef>
+                <a:buFont typeface="Arial" panose="020B0604020202020204" pitchFamily="34" charset="0"/>
+                <a:buChar char="•"/>
+                <a:defRPr sz="1800" kern="1200">
+                  <a:solidFill>
+                    <a:schemeClr val="tx1"/>
+                  </a:solidFill>
+                  <a:latin typeface="+mn-lt"/>
+                  <a:ea typeface="+mn-ea"/>
+                  <a:cs typeface="+mn-cs"/>
+                </a:defRPr>
+              </a:lvl9pPr>
+            </a:lstStyle>
+            <a:p>
+              <a:pPr marL="0" indent="0">
+                <a:buFont typeface="Arial" panose="020B0604020202020204" pitchFamily="34" charset="0"/>
+                <a:buNone/>
+              </a:pPr>
+              <a:r>
+                <a:rPr lang="en-US" sz="1400" b="1" i="1" u="sng" dirty="0" err="1"/>
+                <a:t>RNAseq</a:t>
+              </a:r>
+              <a:endParaRPr lang="en-US" sz="1400" b="1" i="1" dirty="0"/>
+            </a:p>
+            <a:p>
+              <a:pPr marL="0" indent="0">
+                <a:buNone/>
+              </a:pPr>
+              <a:endParaRPr lang="en-US" sz="1400" dirty="0"/>
+            </a:p>
+            <a:p>
+              <a:r>
+                <a:rPr lang="en-US" sz="1400" dirty="0"/>
+                <a:t>Raw data</a:t>
+              </a:r>
+            </a:p>
+            <a:p>
+              <a:endParaRPr lang="en-US" sz="1400" dirty="0"/>
+            </a:p>
+            <a:p>
+              <a:r>
+                <a:rPr lang="en-US" sz="1400" dirty="0"/>
+                <a:t>read counts</a:t>
+              </a:r>
+            </a:p>
+            <a:p>
+              <a:endParaRPr lang="en-US" sz="1400" dirty="0"/>
+            </a:p>
+            <a:p>
+              <a:r>
+                <a:rPr lang="en-US" sz="1400" dirty="0"/>
+                <a:t>all genes (~50,000) were analyzed</a:t>
+              </a:r>
+            </a:p>
+            <a:p>
+              <a:endParaRPr lang="en-US" sz="1400" dirty="0"/>
+            </a:p>
+          </p:txBody>
+        </p:sp>
+        <p:sp>
+          <p:nvSpPr>
+            <p:cNvPr id="28" name="TextBox 27">
+              <a:extLst>
+                <a:ext uri="{FF2B5EF4-FFF2-40B4-BE49-F238E27FC236}">
+                  <a16:creationId xmlns:a16="http://schemas.microsoft.com/office/drawing/2014/main" id="{D2C55100-62BC-BE77-F25C-506CF9EC33AA}"/>
                 </a:ext>
               </a:extLst>
             </p:cNvPr>
@@ -19877,8 +19887,8 @@
           </p:nvSpPr>
           <p:spPr>
             <a:xfrm>
-              <a:off x="2965043" y="1737715"/>
-              <a:ext cx="736099" cy="369332"/>
+              <a:off x="6047041" y="3551087"/>
+              <a:ext cx="2108269" cy="369332"/>
             </a:xfrm>
             <a:prstGeom prst="rect">
               <a:avLst/>
@@ -19893,376 +19903,12 @@
             <a:p>
               <a:r>
                 <a:rPr lang="en-US"/>
-                <a:t>6 WT</a:t>
-              </a:r>
-            </a:p>
-          </p:txBody>
-        </p:sp>
-        <p:sp>
-          <p:nvSpPr>
-            <p:cNvPr id="19" name="TextBox 18">
-              <a:extLst>
-                <a:ext uri="{FF2B5EF4-FFF2-40B4-BE49-F238E27FC236}">
-                  <a16:creationId xmlns:a16="http://schemas.microsoft.com/office/drawing/2014/main" id="{FBA6809C-6D38-343F-E806-9C1ACFE29E06}"/>
-                </a:ext>
-              </a:extLst>
-            </p:cNvPr>
-            <p:cNvSpPr txBox="1"/>
-            <p:nvPr/>
-          </p:nvSpPr>
-          <p:spPr>
-            <a:xfrm>
-              <a:off x="4767943" y="2366516"/>
-              <a:ext cx="710451" cy="369332"/>
-            </a:xfrm>
-            <a:prstGeom prst="rect">
-              <a:avLst/>
-            </a:prstGeom>
-            <a:noFill/>
-          </p:spPr>
-          <p:txBody>
-            <a:bodyPr wrap="none" rtlCol="0">
-              <a:spAutoFit/>
-            </a:bodyPr>
-            <a:lstStyle/>
-            <a:p>
-              <a:r>
-                <a:rPr lang="en-US"/>
-                <a:t>6 KO</a:t>
+                <a:t>cohort: 12 mice (f.)</a:t>
               </a:r>
             </a:p>
           </p:txBody>
         </p:sp>
       </p:grpSp>
-      <p:pic>
-        <p:nvPicPr>
-          <p:cNvPr id="23" name="Picture 22" descr="Z-scored PCA">
-            <a:extLst>
-              <a:ext uri="{FF2B5EF4-FFF2-40B4-BE49-F238E27FC236}">
-                <a16:creationId xmlns:a16="http://schemas.microsoft.com/office/drawing/2014/main" id="{74B10984-737C-E56D-A6DD-D84537E70F2D}"/>
-              </a:ext>
-            </a:extLst>
-          </p:cNvPr>
-          <p:cNvPicPr>
-            <a:picLocks noChangeAspect="1"/>
-          </p:cNvPicPr>
-          <p:nvPr/>
-        </p:nvPicPr>
-        <p:blipFill>
-          <a:blip r:embed="rId3"/>
-          <a:stretch>
-            <a:fillRect/>
-          </a:stretch>
-        </p:blipFill>
-        <p:spPr>
-          <a:xfrm>
-            <a:off x="6554851" y="844955"/>
-            <a:ext cx="5034227" cy="3108435"/>
-          </a:xfrm>
-          <a:prstGeom prst="rect">
-            <a:avLst/>
-          </a:prstGeom>
-        </p:spPr>
-      </p:pic>
-      <p:sp>
-        <p:nvSpPr>
-          <p:cNvPr id="26" name="Textplatzhalter 20">
-            <a:extLst>
-              <a:ext uri="{FF2B5EF4-FFF2-40B4-BE49-F238E27FC236}">
-                <a16:creationId xmlns:a16="http://schemas.microsoft.com/office/drawing/2014/main" id="{0C1A886A-50AB-6AE4-E08C-51C2A97A5331}"/>
-              </a:ext>
-            </a:extLst>
-          </p:cNvPr>
-          <p:cNvSpPr txBox="1">
-            <a:spLocks/>
-          </p:cNvSpPr>
-          <p:nvPr/>
-        </p:nvSpPr>
-        <p:spPr>
-          <a:xfrm>
-            <a:off x="1086918" y="1574800"/>
-            <a:ext cx="3593939" cy="1815882"/>
-          </a:xfrm>
-          <a:prstGeom prst="rect">
-            <a:avLst/>
-          </a:prstGeom>
-        </p:spPr>
-        <p:txBody>
-          <a:bodyPr>
-            <a:spAutoFit/>
-          </a:bodyPr>
-          <a:lstStyle>
-            <a:lvl1pPr marL="285750" indent="-285750" algn="l" defTabSz="914400" rtl="0" eaLnBrk="1" latinLnBrk="0" hangingPunct="1">
-              <a:lnSpc>
-                <a:spcPct val="100000"/>
-              </a:lnSpc>
-              <a:spcBef>
-                <a:spcPts val="0"/>
-              </a:spcBef>
-              <a:spcAft>
-                <a:spcPts val="0"/>
-              </a:spcAft>
-              <a:buFont typeface="Arial" panose="020B0604020202020204" pitchFamily="34" charset="0"/>
-              <a:buChar char="•"/>
-              <a:tabLst/>
-              <a:defRPr sz="1600" b="0" i="0" kern="1200" baseline="0">
-                <a:solidFill>
-                  <a:schemeClr val="tx1"/>
-                </a:solidFill>
-                <a:latin typeface="Arial" panose="020B0604020202020204" pitchFamily="34" charset="0"/>
-                <a:ea typeface="+mn-ea"/>
-                <a:cs typeface="Arial" panose="020B0604020202020204" pitchFamily="34" charset="0"/>
-              </a:defRPr>
-            </a:lvl1pPr>
-            <a:lvl2pPr marL="358775" indent="-206375" algn="l" defTabSz="914400" rtl="0" eaLnBrk="1" latinLnBrk="0" hangingPunct="1">
-              <a:lnSpc>
-                <a:spcPct val="100000"/>
-              </a:lnSpc>
-              <a:spcBef>
-                <a:spcPts val="600"/>
-              </a:spcBef>
-              <a:spcAft>
-                <a:spcPts val="1000"/>
-              </a:spcAft>
-              <a:buFont typeface="Arial" panose="020B0604020202020204" pitchFamily="34" charset="0"/>
-              <a:buChar char="•"/>
-              <a:tabLst/>
-              <a:defRPr sz="1400" b="0" i="0" kern="1200" baseline="0">
-                <a:solidFill>
-                  <a:schemeClr val="tx1"/>
-                </a:solidFill>
-                <a:latin typeface="Arial" panose="020B0604020202020204" pitchFamily="34" charset="0"/>
-                <a:ea typeface="+mn-ea"/>
-                <a:cs typeface="Arial" panose="020B0604020202020204" pitchFamily="34" charset="0"/>
-              </a:defRPr>
-            </a:lvl2pPr>
-            <a:lvl3pPr marL="0" indent="0" algn="l" defTabSz="914400" rtl="0" eaLnBrk="1" latinLnBrk="0" hangingPunct="1">
-              <a:lnSpc>
-                <a:spcPct val="100000"/>
-              </a:lnSpc>
-              <a:spcBef>
-                <a:spcPts val="0"/>
-              </a:spcBef>
-              <a:spcAft>
-                <a:spcPts val="1000"/>
-              </a:spcAft>
-              <a:buFont typeface="Arial" panose="020B0604020202020204" pitchFamily="34" charset="0"/>
-              <a:buChar char="•"/>
-              <a:tabLst/>
-              <a:defRPr sz="1400" b="0" i="0" kern="1200" baseline="0">
-                <a:solidFill>
-                  <a:schemeClr val="tx1"/>
-                </a:solidFill>
-                <a:latin typeface="Arial" panose="020B0604020202020204" pitchFamily="34" charset="0"/>
-                <a:ea typeface="+mn-ea"/>
-                <a:cs typeface="Arial" panose="020B0604020202020204" pitchFamily="34" charset="0"/>
-              </a:defRPr>
-            </a:lvl3pPr>
-            <a:lvl4pPr marL="7938" indent="0" algn="l" defTabSz="914400" rtl="0" eaLnBrk="1" latinLnBrk="0" hangingPunct="1">
-              <a:lnSpc>
-                <a:spcPct val="90000"/>
-              </a:lnSpc>
-              <a:spcBef>
-                <a:spcPts val="500"/>
-              </a:spcBef>
-              <a:buFont typeface="Arial" panose="020B0604020202020204" pitchFamily="34" charset="0"/>
-              <a:buChar char="•"/>
-              <a:tabLst/>
-              <a:defRPr sz="1400" kern="1200" baseline="0">
-                <a:solidFill>
-                  <a:schemeClr val="tx1"/>
-                </a:solidFill>
-                <a:latin typeface="Arial" panose="020B0604020202020204" pitchFamily="34" charset="0"/>
-                <a:ea typeface="+mn-ea"/>
-                <a:cs typeface="+mn-cs"/>
-              </a:defRPr>
-            </a:lvl4pPr>
-            <a:lvl5pPr marL="223838" indent="-215900" algn="l" defTabSz="914400" rtl="0" eaLnBrk="1" latinLnBrk="0" hangingPunct="1">
-              <a:lnSpc>
-                <a:spcPct val="100000"/>
-              </a:lnSpc>
-              <a:spcBef>
-                <a:spcPts val="0"/>
-              </a:spcBef>
-              <a:spcAft>
-                <a:spcPts val="1000"/>
-              </a:spcAft>
-              <a:buClr>
-                <a:schemeClr val="accent2"/>
-              </a:buClr>
-              <a:buFont typeface="+mj-lt"/>
-              <a:buAutoNum type="arabicPeriod"/>
-              <a:tabLst/>
-              <a:defRPr sz="1400" b="0" i="0" kern="1200" baseline="0">
-                <a:solidFill>
-                  <a:schemeClr val="tx1"/>
-                </a:solidFill>
-                <a:latin typeface="Arial" panose="020B0604020202020204" pitchFamily="34" charset="0"/>
-                <a:ea typeface="+mn-ea"/>
-                <a:cs typeface="Arial" panose="020B0604020202020204" pitchFamily="34" charset="0"/>
-              </a:defRPr>
-            </a:lvl5pPr>
-            <a:lvl6pPr marL="223838" indent="-215900" algn="l" defTabSz="914400" rtl="0" eaLnBrk="1" latinLnBrk="0" hangingPunct="1">
-              <a:lnSpc>
-                <a:spcPct val="100000"/>
-              </a:lnSpc>
-              <a:spcBef>
-                <a:spcPts val="600"/>
-              </a:spcBef>
-              <a:spcAft>
-                <a:spcPts val="1000"/>
-              </a:spcAft>
-              <a:buClr>
-                <a:schemeClr val="accent2"/>
-              </a:buClr>
-              <a:buFont typeface="+mj-lt"/>
-              <a:buAutoNum type="alphaLcPeriod"/>
-              <a:tabLst/>
-              <a:defRPr sz="1400" b="0" i="0" kern="1200">
-                <a:solidFill>
-                  <a:schemeClr val="tx1"/>
-                </a:solidFill>
-                <a:latin typeface="Arial" panose="020B0604020202020204" pitchFamily="34" charset="0"/>
-                <a:ea typeface="+mn-ea"/>
-                <a:cs typeface="Arial" panose="020B0604020202020204" pitchFamily="34" charset="0"/>
-              </a:defRPr>
-            </a:lvl6pPr>
-            <a:lvl7pPr marL="2971800" indent="-228600" algn="l" defTabSz="914400" rtl="0" eaLnBrk="1" latinLnBrk="0" hangingPunct="1">
-              <a:lnSpc>
-                <a:spcPct val="90000"/>
-              </a:lnSpc>
-              <a:spcBef>
-                <a:spcPts val="500"/>
-              </a:spcBef>
-              <a:buFont typeface="Arial" panose="020B0604020202020204" pitchFamily="34" charset="0"/>
-              <a:buChar char="•"/>
-              <a:defRPr sz="1800" kern="1200">
-                <a:solidFill>
-                  <a:schemeClr val="tx1"/>
-                </a:solidFill>
-                <a:latin typeface="+mn-lt"/>
-                <a:ea typeface="+mn-ea"/>
-                <a:cs typeface="+mn-cs"/>
-              </a:defRPr>
-            </a:lvl7pPr>
-            <a:lvl8pPr marL="3429000" indent="-228600" algn="l" defTabSz="914400" rtl="0" eaLnBrk="1" latinLnBrk="0" hangingPunct="1">
-              <a:lnSpc>
-                <a:spcPct val="90000"/>
-              </a:lnSpc>
-              <a:spcBef>
-                <a:spcPts val="500"/>
-              </a:spcBef>
-              <a:buFont typeface="Arial" panose="020B0604020202020204" pitchFamily="34" charset="0"/>
-              <a:buChar char="•"/>
-              <a:defRPr sz="1800" kern="1200">
-                <a:solidFill>
-                  <a:schemeClr val="tx1"/>
-                </a:solidFill>
-                <a:latin typeface="+mn-lt"/>
-                <a:ea typeface="+mn-ea"/>
-                <a:cs typeface="+mn-cs"/>
-              </a:defRPr>
-            </a:lvl8pPr>
-            <a:lvl9pPr marL="3886200" indent="-228600" algn="l" defTabSz="914400" rtl="0" eaLnBrk="1" latinLnBrk="0" hangingPunct="1">
-              <a:lnSpc>
-                <a:spcPct val="90000"/>
-              </a:lnSpc>
-              <a:spcBef>
-                <a:spcPts val="500"/>
-              </a:spcBef>
-              <a:buFont typeface="Arial" panose="020B0604020202020204" pitchFamily="34" charset="0"/>
-              <a:buChar char="•"/>
-              <a:defRPr sz="1800" kern="1200">
-                <a:solidFill>
-                  <a:schemeClr val="tx1"/>
-                </a:solidFill>
-                <a:latin typeface="+mn-lt"/>
-                <a:ea typeface="+mn-ea"/>
-                <a:cs typeface="+mn-cs"/>
-              </a:defRPr>
-            </a:lvl9pPr>
-          </a:lstStyle>
-          <a:p>
-            <a:pPr marL="0" indent="0">
-              <a:buFont typeface="Arial" panose="020B0604020202020204" pitchFamily="34" charset="0"/>
-              <a:buNone/>
-            </a:pPr>
-            <a:r>
-              <a:rPr lang="en-US" sz="1400" b="1" i="1" u="sng" dirty="0" err="1"/>
-              <a:t>RNAseq</a:t>
-            </a:r>
-            <a:endParaRPr lang="en-US" sz="1400" b="1" i="1" dirty="0"/>
-          </a:p>
-          <a:p>
-            <a:pPr marL="0" indent="0">
-              <a:buNone/>
-            </a:pPr>
-            <a:endParaRPr lang="en-US" sz="1400" dirty="0"/>
-          </a:p>
-          <a:p>
-            <a:r>
-              <a:rPr lang="en-US" sz="1400" dirty="0"/>
-              <a:t>read counts</a:t>
-            </a:r>
-          </a:p>
-          <a:p>
-            <a:endParaRPr lang="en-US" sz="1400" dirty="0"/>
-          </a:p>
-          <a:p>
-            <a:r>
-              <a:rPr lang="en-US" sz="1400" dirty="0"/>
-              <a:t>raw data</a:t>
-            </a:r>
-          </a:p>
-          <a:p>
-            <a:endParaRPr lang="en-US" sz="1400" dirty="0"/>
-          </a:p>
-          <a:p>
-            <a:r>
-              <a:rPr lang="en-US" sz="1400" dirty="0"/>
-              <a:t>all genes (~50,000) were analyzed</a:t>
-            </a:r>
-          </a:p>
-          <a:p>
-            <a:endParaRPr lang="en-US" sz="1400" dirty="0"/>
-          </a:p>
-        </p:txBody>
-      </p:sp>
-      <p:sp>
-        <p:nvSpPr>
-          <p:cNvPr id="28" name="TextBox 27">
-            <a:extLst>
-              <a:ext uri="{FF2B5EF4-FFF2-40B4-BE49-F238E27FC236}">
-                <a16:creationId xmlns:a16="http://schemas.microsoft.com/office/drawing/2014/main" id="{D2C55100-62BC-BE77-F25C-506CF9EC33AA}"/>
-              </a:ext>
-            </a:extLst>
-          </p:cNvPr>
-          <p:cNvSpPr txBox="1"/>
-          <p:nvPr/>
-        </p:nvSpPr>
-        <p:spPr>
-          <a:xfrm>
-            <a:off x="3694259" y="1172497"/>
-            <a:ext cx="2108269" cy="369332"/>
-          </a:xfrm>
-          <a:prstGeom prst="rect">
-            <a:avLst/>
-          </a:prstGeom>
-          <a:noFill/>
-        </p:spPr>
-        <p:txBody>
-          <a:bodyPr wrap="none" rtlCol="0">
-            <a:spAutoFit/>
-          </a:bodyPr>
-          <a:lstStyle/>
-          <a:p>
-            <a:r>
-              <a:rPr lang="en-US"/>
-              <a:t>cohort: 12 mice (f.)</a:t>
-            </a:r>
-          </a:p>
-        </p:txBody>
-      </p:sp>
       <p:grpSp>
         <p:nvGrpSpPr>
           <p:cNvPr id="30" name="Group 29">
@@ -20277,7 +19923,7 @@
         </p:nvGrpSpPr>
         <p:grpSpPr>
           <a:xfrm>
-            <a:off x="1184889" y="4568000"/>
+            <a:off x="7466569" y="4581884"/>
             <a:ext cx="3593939" cy="1431161"/>
             <a:chOff x="1184889" y="4568000"/>
             <a:chExt cx="3593939" cy="1431161"/>
@@ -20507,8 +20153,8 @@
                 <a:buNone/>
               </a:pPr>
               <a:r>
-                <a:rPr lang="en-US" sz="1400"/>
-                <a:t>For later QC (separate cohorts):</a:t>
+                <a:rPr lang="en-US" sz="1400" dirty="0"/>
+                <a:t>Further analysis (separate cohorts):</a:t>
               </a:r>
             </a:p>
             <a:p>
@@ -20516,35 +20162,35 @@
                 <a:buFont typeface="Arial" panose="020B0604020202020204" pitchFamily="34" charset="0"/>
                 <a:buNone/>
               </a:pPr>
-              <a:endParaRPr lang="en-US" sz="1400"/>
+              <a:endParaRPr lang="en-US" sz="1400" dirty="0"/>
             </a:p>
             <a:p>
               <a:r>
-                <a:rPr lang="en-US" sz="1400" b="1" i="1"/>
+                <a:rPr lang="en-US" sz="1400" b="1" i="1" dirty="0"/>
                 <a:t>Proteome</a:t>
               </a:r>
               <a:r>
-                <a:rPr lang="en-US" sz="1400"/>
+                <a:rPr lang="en-US" sz="1400" dirty="0"/>
                 <a:t> hits  (3 WT, 3 KO)</a:t>
               </a:r>
             </a:p>
             <a:p>
               <a:r>
-                <a:rPr lang="en-US" sz="1400" b="1" i="1"/>
+                <a:rPr lang="en-US" sz="1400" b="1" i="1" dirty="0"/>
                 <a:t>Metabolomics</a:t>
               </a:r>
               <a:r>
-                <a:rPr lang="en-US" sz="1400"/>
+                <a:rPr lang="en-US" sz="1400" dirty="0"/>
                 <a:t>  (6 WT, 6 KO)</a:t>
               </a:r>
             </a:p>
             <a:p>
               <a:r>
-                <a:rPr lang="en-US" sz="1400" b="1" i="1" err="1"/>
+                <a:rPr lang="en-US" sz="1400" b="1" i="1" dirty="0" err="1"/>
                 <a:t>Ubiquitomics</a:t>
               </a:r>
               <a:r>
-                <a:rPr lang="en-US" sz="1400"/>
+                <a:rPr lang="en-US" sz="1400" dirty="0"/>
                 <a:t>   (3 WT, 3 KO)</a:t>
               </a:r>
             </a:p>
@@ -20586,6 +20232,194 @@
           </p:txBody>
         </p:sp>
       </p:grpSp>
+      <p:grpSp>
+        <p:nvGrpSpPr>
+          <p:cNvPr id="31" name="Group 30">
+            <a:extLst>
+              <a:ext uri="{FF2B5EF4-FFF2-40B4-BE49-F238E27FC236}">
+                <a16:creationId xmlns:a16="http://schemas.microsoft.com/office/drawing/2014/main" id="{75007C93-39A0-BEB0-4BD9-B284A83FD685}"/>
+              </a:ext>
+            </a:extLst>
+          </p:cNvPr>
+          <p:cNvGrpSpPr/>
+          <p:nvPr/>
+        </p:nvGrpSpPr>
+        <p:grpSpPr>
+          <a:xfrm>
+            <a:off x="602922" y="1651762"/>
+            <a:ext cx="4884258" cy="2107441"/>
+            <a:chOff x="8379050" y="3378836"/>
+            <a:chExt cx="4884258" cy="2107441"/>
+          </a:xfrm>
+        </p:grpSpPr>
+        <p:pic>
+          <p:nvPicPr>
+            <p:cNvPr id="32" name="Picture 31">
+              <a:extLst>
+                <a:ext uri="{FF2B5EF4-FFF2-40B4-BE49-F238E27FC236}">
+                  <a16:creationId xmlns:a16="http://schemas.microsoft.com/office/drawing/2014/main" id="{7AF198EA-642A-139E-2CAB-75231B69513C}"/>
+                </a:ext>
+              </a:extLst>
+            </p:cNvPr>
+            <p:cNvPicPr>
+              <a:picLocks noChangeAspect="1"/>
+            </p:cNvPicPr>
+            <p:nvPr/>
+          </p:nvPicPr>
+          <p:blipFill rotWithShape="1">
+            <a:blip r:embed="rId4"/>
+            <a:srcRect t="13762"/>
+            <a:stretch/>
+          </p:blipFill>
+          <p:spPr>
+            <a:xfrm>
+              <a:off x="8379050" y="3933076"/>
+              <a:ext cx="2244964" cy="1551875"/>
+            </a:xfrm>
+            <a:prstGeom prst="rect">
+              <a:avLst/>
+            </a:prstGeom>
+          </p:spPr>
+        </p:pic>
+        <p:sp>
+          <p:nvSpPr>
+            <p:cNvPr id="33" name="TextBox 32">
+              <a:extLst>
+                <a:ext uri="{FF2B5EF4-FFF2-40B4-BE49-F238E27FC236}">
+                  <a16:creationId xmlns:a16="http://schemas.microsoft.com/office/drawing/2014/main" id="{8525473A-A63F-4BED-666C-2DBDF86C224F}"/>
+                </a:ext>
+              </a:extLst>
+            </p:cNvPr>
+            <p:cNvSpPr txBox="1"/>
+            <p:nvPr/>
+          </p:nvSpPr>
+          <p:spPr>
+            <a:xfrm>
+              <a:off x="10624014" y="4778391"/>
+              <a:ext cx="2639294" cy="707886"/>
+            </a:xfrm>
+            <a:prstGeom prst="rect">
+              <a:avLst/>
+            </a:prstGeom>
+            <a:noFill/>
+          </p:spPr>
+          <p:txBody>
+            <a:bodyPr wrap="square" rtlCol="0">
+              <a:spAutoFit/>
+            </a:bodyPr>
+            <a:lstStyle/>
+            <a:p>
+              <a:r>
+                <a:rPr lang="en-GB" sz="1000" dirty="0">
+                  <a:effectLst/>
+                  <a:latin typeface="ArialMT"/>
+                </a:rPr>
+                <a:t>Levels of mRNA from gastrocnemius muscle from wild-type (WT) and skeletal muscle (Acta1-Cre) Nfe2l1</a:t>
+              </a:r>
+              <a:br>
+                <a:rPr lang="en-GB" sz="1000" dirty="0">
+                  <a:effectLst/>
+                  <a:latin typeface="ArialMT"/>
+                </a:rPr>
+              </a:br>
+              <a:r>
+                <a:rPr lang="en-GB" sz="1000" dirty="0">
+                  <a:effectLst/>
+                  <a:latin typeface="ArialMT"/>
+                </a:rPr>
+                <a:t>knock-out (KO) mice.</a:t>
+              </a:r>
+              <a:endParaRPr lang="en-GB" sz="1000" dirty="0">
+                <a:effectLst/>
+              </a:endParaRPr>
+            </a:p>
+          </p:txBody>
+        </p:sp>
+        <p:sp>
+          <p:nvSpPr>
+            <p:cNvPr id="34" name="TextBox 33">
+              <a:extLst>
+                <a:ext uri="{FF2B5EF4-FFF2-40B4-BE49-F238E27FC236}">
+                  <a16:creationId xmlns:a16="http://schemas.microsoft.com/office/drawing/2014/main" id="{4AAC6300-AB12-2012-6819-5DA6DE64410A}"/>
+                </a:ext>
+              </a:extLst>
+            </p:cNvPr>
+            <p:cNvSpPr txBox="1"/>
+            <p:nvPr/>
+          </p:nvSpPr>
+          <p:spPr>
+            <a:xfrm>
+              <a:off x="8555233" y="3378836"/>
+              <a:ext cx="2258952" cy="523220"/>
+            </a:xfrm>
+            <a:prstGeom prst="rect">
+              <a:avLst/>
+            </a:prstGeom>
+            <a:noFill/>
+          </p:spPr>
+          <p:txBody>
+            <a:bodyPr wrap="none" rtlCol="0">
+              <a:spAutoFit/>
+            </a:bodyPr>
+            <a:lstStyle/>
+            <a:p>
+              <a:r>
+                <a:rPr lang="en-US" sz="1400" b="1" dirty="0"/>
+                <a:t>tissue specific knockout</a:t>
+              </a:r>
+            </a:p>
+            <a:p>
+              <a:r>
+                <a:rPr lang="en-US" sz="1400" dirty="0"/>
+                <a:t>(</a:t>
+              </a:r>
+              <a:r>
+                <a:rPr lang="en-US" sz="1400" i="1" dirty="0"/>
+                <a:t>Cre-Lox recombination</a:t>
+              </a:r>
+              <a:r>
+                <a:rPr lang="en-US" sz="1400" dirty="0"/>
+                <a:t>)</a:t>
+              </a:r>
+            </a:p>
+          </p:txBody>
+        </p:sp>
+      </p:grpSp>
+      <p:sp>
+        <p:nvSpPr>
+          <p:cNvPr id="37" name="TextBox 36">
+            <a:extLst>
+              <a:ext uri="{FF2B5EF4-FFF2-40B4-BE49-F238E27FC236}">
+                <a16:creationId xmlns:a16="http://schemas.microsoft.com/office/drawing/2014/main" id="{02D54EA5-A5A3-AC7B-2E70-A2E063DF6E11}"/>
+              </a:ext>
+            </a:extLst>
+          </p:cNvPr>
+          <p:cNvSpPr txBox="1"/>
+          <p:nvPr/>
+        </p:nvSpPr>
+        <p:spPr>
+          <a:xfrm>
+            <a:off x="754221" y="1233359"/>
+            <a:ext cx="2313454" cy="369332"/>
+          </a:xfrm>
+          <a:prstGeom prst="rect">
+            <a:avLst/>
+          </a:prstGeom>
+          <a:noFill/>
+        </p:spPr>
+        <p:txBody>
+          <a:bodyPr wrap="none" rtlCol="0">
+            <a:spAutoFit/>
+          </a:bodyPr>
+          <a:lstStyle/>
+          <a:p>
+            <a:r>
+              <a:rPr lang="en-US" dirty="0"/>
+              <a:t>Experimental Design</a:t>
+            </a:r>
+          </a:p>
+        </p:txBody>
+      </p:sp>
     </p:spTree>
     <p:extLst>
       <p:ext uri="{BB962C8B-B14F-4D97-AF65-F5344CB8AC3E}">
@@ -20694,6 +20528,51 @@
                       </p:childTnLst>
                     </p:cTn>
                   </p:par>
+                  <p:par>
+                    <p:cTn id="11" fill="hold">
+                      <p:stCondLst>
+                        <p:cond delay="indefinite"/>
+                      </p:stCondLst>
+                      <p:childTnLst>
+                        <p:par>
+                          <p:cTn id="12" fill="hold">
+                            <p:stCondLst>
+                              <p:cond delay="0"/>
+                            </p:stCondLst>
+                            <p:childTnLst>
+                              <p:par>
+                                <p:cTn id="13" presetID="1" presetClass="entr" presetSubtype="0" fill="hold" nodeType="clickEffect">
+                                  <p:stCondLst>
+                                    <p:cond delay="0"/>
+                                  </p:stCondLst>
+                                  <p:childTnLst>
+                                    <p:set>
+                                      <p:cBhvr>
+                                        <p:cTn id="14" dur="1" fill="hold">
+                                          <p:stCondLst>
+                                            <p:cond delay="0"/>
+                                          </p:stCondLst>
+                                        </p:cTn>
+                                        <p:tgtEl>
+                                          <p:spTgt spid="31"/>
+                                        </p:tgtEl>
+                                        <p:attrNameLst>
+                                          <p:attrName>style.visibility</p:attrName>
+                                        </p:attrNameLst>
+                                      </p:cBhvr>
+                                      <p:to>
+                                        <p:strVal val="visible"/>
+                                      </p:to>
+                                    </p:set>
+                                  </p:childTnLst>
+                                </p:cTn>
+                              </p:par>
+                            </p:childTnLst>
+                          </p:cTn>
+                        </p:par>
+                      </p:childTnLst>
+                    </p:cTn>
+                  </p:par>
                 </p:childTnLst>
               </p:cTn>
               <p:prevCondLst>
@@ -20763,133 +20642,103 @@
           <a:lstStyle/>
           <a:p>
             <a:r>
-              <a:rPr lang="en-US" dirty="0"/>
-              <a:t>Preliminary analysis</a:t>
+              <a:rPr lang="en-US"/>
+              <a:t>Outline</a:t>
             </a:r>
           </a:p>
         </p:txBody>
       </p:sp>
-      <p:pic>
-        <p:nvPicPr>
-          <p:cNvPr id="7" name="Picture 6" descr="Chart, scatter chart&#10;&#10;Description automatically generated">
-            <a:extLst>
-              <a:ext uri="{FF2B5EF4-FFF2-40B4-BE49-F238E27FC236}">
-                <a16:creationId xmlns:a16="http://schemas.microsoft.com/office/drawing/2014/main" id="{E2192D4C-A7C8-0098-7C4B-084D68AE86DB}"/>
-              </a:ext>
-            </a:extLst>
-          </p:cNvPr>
-          <p:cNvPicPr>
-            <a:picLocks noChangeAspect="1"/>
-          </p:cNvPicPr>
-          <p:nvPr/>
-        </p:nvPicPr>
-        <p:blipFill>
-          <a:blip r:embed="rId3"/>
-          <a:stretch>
-            <a:fillRect/>
-          </a:stretch>
-        </p:blipFill>
-        <p:spPr>
-          <a:xfrm>
-            <a:off x="343329" y="1185860"/>
-            <a:ext cx="5101257" cy="3146879"/>
-          </a:xfrm>
-          <a:prstGeom prst="rect">
-            <a:avLst/>
-          </a:prstGeom>
-        </p:spPr>
-      </p:pic>
-      <p:pic>
-        <p:nvPicPr>
-          <p:cNvPr id="10" name="Picture 9" descr="Chart, scatter chart&#10;&#10;Description automatically generated">
-            <a:extLst>
-              <a:ext uri="{FF2B5EF4-FFF2-40B4-BE49-F238E27FC236}">
-                <a16:creationId xmlns:a16="http://schemas.microsoft.com/office/drawing/2014/main" id="{3702D843-5C02-E29B-43E5-64D57B06AA0D}"/>
-              </a:ext>
-            </a:extLst>
-          </p:cNvPr>
-          <p:cNvPicPr>
-            <a:picLocks noChangeAspect="1"/>
-          </p:cNvPicPr>
-          <p:nvPr/>
-        </p:nvPicPr>
-        <p:blipFill>
-          <a:blip r:embed="rId4"/>
-          <a:stretch>
-            <a:fillRect/>
-          </a:stretch>
-        </p:blipFill>
-        <p:spPr>
-          <a:xfrm>
-            <a:off x="815941" y="4472726"/>
-            <a:ext cx="3752109" cy="2314613"/>
-          </a:xfrm>
-          <a:prstGeom prst="rect">
-            <a:avLst/>
-          </a:prstGeom>
-        </p:spPr>
-      </p:pic>
-      <p:pic>
-        <p:nvPicPr>
-          <p:cNvPr id="15" name="Picture 14" descr="Table&#10;&#10;Description automatically generated">
-            <a:extLst>
-              <a:ext uri="{FF2B5EF4-FFF2-40B4-BE49-F238E27FC236}">
-                <a16:creationId xmlns:a16="http://schemas.microsoft.com/office/drawing/2014/main" id="{52ADEFB1-780C-3A47-63A9-07C8D74B523E}"/>
-              </a:ext>
-            </a:extLst>
-          </p:cNvPr>
-          <p:cNvPicPr>
-            <a:picLocks noChangeAspect="1"/>
-          </p:cNvPicPr>
-          <p:nvPr/>
-        </p:nvPicPr>
-        <p:blipFill>
-          <a:blip r:embed="rId5"/>
-          <a:stretch>
-            <a:fillRect/>
-          </a:stretch>
-        </p:blipFill>
-        <p:spPr>
-          <a:xfrm>
-            <a:off x="5967863" y="1428167"/>
-            <a:ext cx="5880808" cy="3631796"/>
-          </a:xfrm>
-          <a:prstGeom prst="rect">
-            <a:avLst/>
-          </a:prstGeom>
-        </p:spPr>
-      </p:pic>
       <p:sp>
         <p:nvSpPr>
-          <p:cNvPr id="16" name="TextBox 15">
-            <a:extLst>
-              <a:ext uri="{FF2B5EF4-FFF2-40B4-BE49-F238E27FC236}">
-                <a16:creationId xmlns:a16="http://schemas.microsoft.com/office/drawing/2014/main" id="{53D3FB4C-D355-C54E-B6A3-A37A9763CA5C}"/>
-              </a:ext>
-            </a:extLst>
-          </p:cNvPr>
-          <p:cNvSpPr txBox="1"/>
-          <p:nvPr/>
+          <p:cNvPr id="21" name="Textplatzhalter 20">
+            <a:extLst>
+              <a:ext uri="{FF2B5EF4-FFF2-40B4-BE49-F238E27FC236}">
+                <a16:creationId xmlns:a16="http://schemas.microsoft.com/office/drawing/2014/main" id="{9635A95F-77C9-2242-A3FA-55C916238FD1}"/>
+              </a:ext>
+            </a:extLst>
+          </p:cNvPr>
+          <p:cNvSpPr>
+            <a:spLocks noGrp="1"/>
+          </p:cNvSpPr>
+          <p:nvPr>
+            <p:ph type="body" sz="quarter" idx="35"/>
+          </p:nvPr>
         </p:nvSpPr>
         <p:spPr>
           <a:xfrm>
-            <a:off x="6791250" y="5080305"/>
-            <a:ext cx="1510350" cy="261610"/>
-          </a:xfrm>
-          <a:prstGeom prst="rect">
-            <a:avLst/>
-          </a:prstGeom>
-          <a:noFill/>
+            <a:off x="1448481" y="1921329"/>
+            <a:ext cx="7553325" cy="2108269"/>
+          </a:xfrm>
         </p:spPr>
         <p:txBody>
-          <a:bodyPr wrap="none" rtlCol="0">
-            <a:spAutoFit/>
-          </a:bodyPr>
+          <a:bodyPr/>
           <a:lstStyle/>
           <a:p>
-            <a:r>
-              <a:rPr lang="en-US" sz="1100" dirty="0"/>
-              <a:t>(canonical pathways)</a:t>
+            <a:pPr marL="342900" indent="-342900">
+              <a:buFont typeface="+mj-lt"/>
+              <a:buAutoNum type="arabicPeriod"/>
+            </a:pPr>
+            <a:r>
+              <a:rPr lang="en-US" dirty="0"/>
+              <a:t>Differential Expression Analysis</a:t>
+            </a:r>
+          </a:p>
+          <a:p>
+            <a:pPr marL="342900" indent="-342900">
+              <a:buFont typeface="+mj-lt"/>
+              <a:buAutoNum type="arabicPeriod"/>
+            </a:pPr>
+            <a:endParaRPr lang="en-US" dirty="0"/>
+          </a:p>
+          <a:p>
+            <a:pPr marL="342900" indent="-342900">
+              <a:buFont typeface="+mj-lt"/>
+              <a:buAutoNum type="arabicPeriod"/>
+            </a:pPr>
+            <a:r>
+              <a:rPr lang="en-US" dirty="0"/>
+              <a:t>Gene Set Enrichment Analysis</a:t>
+            </a:r>
+          </a:p>
+          <a:p>
+            <a:pPr marL="342900" indent="-342900">
+              <a:buFont typeface="+mj-lt"/>
+              <a:buAutoNum type="arabicPeriod"/>
+            </a:pPr>
+            <a:endParaRPr lang="en-US" dirty="0"/>
+          </a:p>
+          <a:p>
+            <a:pPr marL="342900" indent="-342900">
+              <a:buFont typeface="+mj-lt"/>
+              <a:buAutoNum type="arabicPeriod"/>
+            </a:pPr>
+            <a:r>
+              <a:rPr lang="en-US" dirty="0"/>
+              <a:t>Multi-omics Analysis</a:t>
+            </a:r>
+          </a:p>
+          <a:p>
+            <a:pPr marL="342900" indent="-342900">
+              <a:buFont typeface="+mj-lt"/>
+              <a:buAutoNum type="arabicPeriod"/>
+            </a:pPr>
+            <a:endParaRPr lang="en-US" dirty="0"/>
+          </a:p>
+          <a:p>
+            <a:pPr marL="342900" indent="-342900">
+              <a:buFont typeface="+mj-lt"/>
+              <a:buAutoNum type="arabicPeriod"/>
+            </a:pPr>
+            <a:r>
+              <a:rPr lang="en-US" dirty="0"/>
+              <a:t>R Shiny app for diff. gene expr. Analysis “on the fly” [optional]</a:t>
+            </a:r>
+          </a:p>
+          <a:p>
+            <a:pPr marL="415925" lvl="1" indent="-342900"/>
+            <a:r>
+              <a:rPr lang="en-US" dirty="0"/>
+              <a:t>with custom selectable DB</a:t>
             </a:r>
           </a:p>
         </p:txBody>
@@ -20897,7 +20746,7 @@
     </p:spTree>
     <p:extLst>
       <p:ext uri="{BB962C8B-B14F-4D97-AF65-F5344CB8AC3E}">
-        <p14:creationId xmlns:p14="http://schemas.microsoft.com/office/powerpoint/2010/main" val="3562857506"/>
+        <p14:creationId xmlns:p14="http://schemas.microsoft.com/office/powerpoint/2010/main" val="3450116910"/>
       </p:ext>
     </p:extLst>
   </p:cSld>
@@ -20951,108 +20800,141 @@
           <a:lstStyle/>
           <a:p>
             <a:r>
-              <a:rPr lang="en-US"/>
-              <a:t>Outline</a:t>
+              <a:rPr lang="en-US" dirty="0"/>
+              <a:t>Preliminary analysis</a:t>
             </a:r>
           </a:p>
         </p:txBody>
       </p:sp>
+      <p:pic>
+        <p:nvPicPr>
+          <p:cNvPr id="10" name="Picture 9" descr="Chart, scatter chart&#10;&#10;Description automatically generated">
+            <a:extLst>
+              <a:ext uri="{FF2B5EF4-FFF2-40B4-BE49-F238E27FC236}">
+                <a16:creationId xmlns:a16="http://schemas.microsoft.com/office/drawing/2014/main" id="{3702D843-5C02-E29B-43E5-64D57B06AA0D}"/>
+              </a:ext>
+            </a:extLst>
+          </p:cNvPr>
+          <p:cNvPicPr>
+            <a:picLocks noChangeAspect="1"/>
+          </p:cNvPicPr>
+          <p:nvPr/>
+        </p:nvPicPr>
+        <p:blipFill>
+          <a:blip r:embed="rId3"/>
+          <a:stretch>
+            <a:fillRect/>
+          </a:stretch>
+        </p:blipFill>
+        <p:spPr>
+          <a:xfrm>
+            <a:off x="815941" y="4472726"/>
+            <a:ext cx="3752109" cy="2314613"/>
+          </a:xfrm>
+          <a:prstGeom prst="rect">
+            <a:avLst/>
+          </a:prstGeom>
+        </p:spPr>
+      </p:pic>
+      <p:pic>
+        <p:nvPicPr>
+          <p:cNvPr id="15" name="Picture 14" descr="Table&#10;&#10;Description automatically generated">
+            <a:extLst>
+              <a:ext uri="{FF2B5EF4-FFF2-40B4-BE49-F238E27FC236}">
+                <a16:creationId xmlns:a16="http://schemas.microsoft.com/office/drawing/2014/main" id="{52ADEFB1-780C-3A47-63A9-07C8D74B523E}"/>
+              </a:ext>
+            </a:extLst>
+          </p:cNvPr>
+          <p:cNvPicPr>
+            <a:picLocks noChangeAspect="1"/>
+          </p:cNvPicPr>
+          <p:nvPr/>
+        </p:nvPicPr>
+        <p:blipFill>
+          <a:blip r:embed="rId4"/>
+          <a:stretch>
+            <a:fillRect/>
+          </a:stretch>
+        </p:blipFill>
+        <p:spPr>
+          <a:xfrm>
+            <a:off x="6308203" y="1428167"/>
+            <a:ext cx="5540468" cy="3421613"/>
+          </a:xfrm>
+          <a:prstGeom prst="rect">
+            <a:avLst/>
+          </a:prstGeom>
+        </p:spPr>
+      </p:pic>
       <p:sp>
         <p:nvSpPr>
-          <p:cNvPr id="21" name="Textplatzhalter 20">
-            <a:extLst>
-              <a:ext uri="{FF2B5EF4-FFF2-40B4-BE49-F238E27FC236}">
-                <a16:creationId xmlns:a16="http://schemas.microsoft.com/office/drawing/2014/main" id="{9635A95F-77C9-2242-A3FA-55C916238FD1}"/>
-              </a:ext>
-            </a:extLst>
-          </p:cNvPr>
-          <p:cNvSpPr>
-            <a:spLocks noGrp="1"/>
-          </p:cNvSpPr>
-          <p:nvPr>
-            <p:ph type="body" sz="quarter" idx="35"/>
-          </p:nvPr>
+          <p:cNvPr id="16" name="TextBox 15">
+            <a:extLst>
+              <a:ext uri="{FF2B5EF4-FFF2-40B4-BE49-F238E27FC236}">
+                <a16:creationId xmlns:a16="http://schemas.microsoft.com/office/drawing/2014/main" id="{53D3FB4C-D355-C54E-B6A3-A37A9763CA5C}"/>
+              </a:ext>
+            </a:extLst>
+          </p:cNvPr>
+          <p:cNvSpPr txBox="1"/>
+          <p:nvPr/>
         </p:nvSpPr>
         <p:spPr>
           <a:xfrm>
-            <a:off x="1448481" y="1921329"/>
-            <a:ext cx="7553325" cy="2457083"/>
-          </a:xfrm>
+            <a:off x="6988019" y="4970464"/>
+            <a:ext cx="1510350" cy="261610"/>
+          </a:xfrm>
+          <a:prstGeom prst="rect">
+            <a:avLst/>
+          </a:prstGeom>
+          <a:noFill/>
         </p:spPr>
         <p:txBody>
-          <a:bodyPr/>
+          <a:bodyPr wrap="none" rtlCol="0">
+            <a:spAutoFit/>
+          </a:bodyPr>
           <a:lstStyle/>
           <a:p>
-            <a:pPr marL="342900" indent="-342900">
-              <a:buFont typeface="+mj-lt"/>
-              <a:buAutoNum type="arabicPeriod"/>
-            </a:pPr>
-            <a:r>
-              <a:rPr lang="en-US" dirty="0"/>
-              <a:t>Processing pipeline with GSEA</a:t>
-            </a:r>
-          </a:p>
-          <a:p>
-            <a:pPr marL="415925" lvl="1" indent="-342900"/>
-            <a:r>
-              <a:rPr lang="en-US" dirty="0"/>
-              <a:t>GO Analysis / KEGG Analysis</a:t>
-            </a:r>
-          </a:p>
-          <a:p>
-            <a:pPr marL="415925" lvl="1" indent="-342900"/>
-            <a:r>
-              <a:rPr lang="en-US" dirty="0"/>
-              <a:t>top regulated genes</a:t>
-            </a:r>
-          </a:p>
-          <a:p>
-            <a:pPr marL="342900" indent="-342900">
-              <a:buFont typeface="+mj-lt"/>
-              <a:buAutoNum type="arabicPeriod"/>
-            </a:pPr>
-            <a:endParaRPr lang="en-US" dirty="0"/>
-          </a:p>
-          <a:p>
-            <a:pPr marL="342900" indent="-342900">
-              <a:buFont typeface="+mj-lt"/>
-              <a:buAutoNum type="arabicPeriod"/>
-            </a:pPr>
-            <a:r>
-              <a:rPr lang="en-US" dirty="0"/>
-              <a:t>Producing R markdown report for analysis</a:t>
-            </a:r>
-          </a:p>
-          <a:p>
-            <a:pPr marL="342900" indent="-342900">
-              <a:buFont typeface="+mj-lt"/>
-              <a:buAutoNum type="arabicPeriod"/>
-            </a:pPr>
-            <a:endParaRPr lang="en-US" dirty="0"/>
-          </a:p>
-          <a:p>
-            <a:pPr marL="342900" indent="-342900">
-              <a:buFont typeface="+mj-lt"/>
-              <a:buAutoNum type="arabicPeriod"/>
-            </a:pPr>
-            <a:r>
-              <a:rPr lang="en-US" dirty="0"/>
-              <a:t>R Shiny app for diff. gene expr. Analysis “on the fly”</a:t>
-            </a:r>
-          </a:p>
-          <a:p>
-            <a:pPr marL="415925" lvl="1" indent="-342900"/>
-            <a:r>
-              <a:rPr lang="en-US" dirty="0"/>
-              <a:t>with custom selectable DB</a:t>
+            <a:r>
+              <a:rPr lang="en-US" sz="1100" dirty="0"/>
+              <a:t>(canonical pathways)</a:t>
             </a:r>
           </a:p>
         </p:txBody>
       </p:sp>
+      <p:pic>
+        <p:nvPicPr>
+          <p:cNvPr id="18" name="Picture 17">
+            <a:extLst>
+              <a:ext uri="{FF2B5EF4-FFF2-40B4-BE49-F238E27FC236}">
+                <a16:creationId xmlns:a16="http://schemas.microsoft.com/office/drawing/2014/main" id="{23FFBBC8-079A-9744-D5EC-41EEA5E0C9F8}"/>
+              </a:ext>
+            </a:extLst>
+          </p:cNvPr>
+          <p:cNvPicPr>
+            <a:picLocks noChangeAspect="1"/>
+          </p:cNvPicPr>
+          <p:nvPr/>
+        </p:nvPicPr>
+        <p:blipFill>
+          <a:blip r:embed="rId5"/>
+          <a:stretch>
+            <a:fillRect/>
+          </a:stretch>
+        </p:blipFill>
+        <p:spPr>
+          <a:xfrm>
+            <a:off x="378457" y="1254349"/>
+            <a:ext cx="4889500" cy="3009900"/>
+          </a:xfrm>
+          <a:prstGeom prst="rect">
+            <a:avLst/>
+          </a:prstGeom>
+        </p:spPr>
+      </p:pic>
     </p:spTree>
     <p:extLst>
       <p:ext uri="{BB962C8B-B14F-4D97-AF65-F5344CB8AC3E}">
-        <p14:creationId xmlns:p14="http://schemas.microsoft.com/office/powerpoint/2010/main" val="3450116910"/>
+        <p14:creationId xmlns:p14="http://schemas.microsoft.com/office/powerpoint/2010/main" val="3562857506"/>
       </p:ext>
     </p:extLst>
   </p:cSld>

</xml_diff>